<commit_message>
Finiish essay, start to write dissertation.
</commit_message>
<xml_diff>
--- a/Essay/Figures.pptx
+++ b/Essay/Figures.pptx
@@ -161,7 +161,6 @@
           </a:p>
         </c:rich>
       </c:tx>
-      <c:layout/>
       <c:overlay val="0"/>
       <c:spPr>
         <a:noFill/>
@@ -369,11 +368,11 @@
         </c:dLbls>
         <c:marker val="1"/>
         <c:smooth val="0"/>
-        <c:axId val="397313192"/>
-        <c:axId val="397314368"/>
+        <c:axId val="477699232"/>
+        <c:axId val="477699624"/>
       </c:lineChart>
       <c:catAx>
-        <c:axId val="397313192"/>
+        <c:axId val="477699232"/>
         <c:scaling>
           <c:orientation val="minMax"/>
         </c:scaling>
@@ -416,7 +415,7 @@
             <a:endParaRPr lang="zh-CN"/>
           </a:p>
         </c:txPr>
-        <c:crossAx val="397314368"/>
+        <c:crossAx val="477699624"/>
         <c:crosses val="autoZero"/>
         <c:auto val="1"/>
         <c:lblAlgn val="ctr"/>
@@ -424,7 +423,7 @@
         <c:noMultiLvlLbl val="0"/>
       </c:catAx>
       <c:valAx>
-        <c:axId val="397314368"/>
+        <c:axId val="477699624"/>
         <c:scaling>
           <c:orientation val="minMax"/>
         </c:scaling>
@@ -475,7 +474,7 @@
             <a:endParaRPr lang="zh-CN"/>
           </a:p>
         </c:txPr>
-        <c:crossAx val="397313192"/>
+        <c:crossAx val="477699232"/>
         <c:crosses val="autoZero"/>
         <c:crossBetween val="between"/>
       </c:valAx>
@@ -489,7 +488,6 @@
     </c:plotArea>
     <c:legend>
       <c:legendPos val="b"/>
-      <c:layout/>
       <c:overlay val="0"/>
       <c:spPr>
         <a:noFill/>
@@ -1220,7 +1218,7 @@
           <a:p>
             <a:fld id="{CE144EE9-ED3E-4C40-84F5-22B68B55337D}" type="datetimeFigureOut">
               <a:rPr lang="zh-CN" altLang="en-US" smtClean="0"/>
-              <a:t>2015/10/12</a:t>
+              <a:t>2015/11/23</a:t>
             </a:fld>
             <a:endParaRPr lang="zh-CN" altLang="en-US"/>
           </a:p>
@@ -1390,7 +1388,7 @@
           <a:p>
             <a:fld id="{CE144EE9-ED3E-4C40-84F5-22B68B55337D}" type="datetimeFigureOut">
               <a:rPr lang="zh-CN" altLang="en-US" smtClean="0"/>
-              <a:t>2015/10/12</a:t>
+              <a:t>2015/11/23</a:t>
             </a:fld>
             <a:endParaRPr lang="zh-CN" altLang="en-US"/>
           </a:p>
@@ -1570,7 +1568,7 @@
           <a:p>
             <a:fld id="{CE144EE9-ED3E-4C40-84F5-22B68B55337D}" type="datetimeFigureOut">
               <a:rPr lang="zh-CN" altLang="en-US" smtClean="0"/>
-              <a:t>2015/10/12</a:t>
+              <a:t>2015/11/23</a:t>
             </a:fld>
             <a:endParaRPr lang="zh-CN" altLang="en-US"/>
           </a:p>
@@ -1740,7 +1738,7 @@
           <a:p>
             <a:fld id="{CE144EE9-ED3E-4C40-84F5-22B68B55337D}" type="datetimeFigureOut">
               <a:rPr lang="zh-CN" altLang="en-US" smtClean="0"/>
-              <a:t>2015/10/12</a:t>
+              <a:t>2015/11/23</a:t>
             </a:fld>
             <a:endParaRPr lang="zh-CN" altLang="en-US"/>
           </a:p>
@@ -1986,7 +1984,7 @@
           <a:p>
             <a:fld id="{CE144EE9-ED3E-4C40-84F5-22B68B55337D}" type="datetimeFigureOut">
               <a:rPr lang="zh-CN" altLang="en-US" smtClean="0"/>
-              <a:t>2015/10/12</a:t>
+              <a:t>2015/11/23</a:t>
             </a:fld>
             <a:endParaRPr lang="zh-CN" altLang="en-US"/>
           </a:p>
@@ -2218,7 +2216,7 @@
           <a:p>
             <a:fld id="{CE144EE9-ED3E-4C40-84F5-22B68B55337D}" type="datetimeFigureOut">
               <a:rPr lang="zh-CN" altLang="en-US" smtClean="0"/>
-              <a:t>2015/10/12</a:t>
+              <a:t>2015/11/23</a:t>
             </a:fld>
             <a:endParaRPr lang="zh-CN" altLang="en-US"/>
           </a:p>
@@ -2585,7 +2583,7 @@
           <a:p>
             <a:fld id="{CE144EE9-ED3E-4C40-84F5-22B68B55337D}" type="datetimeFigureOut">
               <a:rPr lang="zh-CN" altLang="en-US" smtClean="0"/>
-              <a:t>2015/10/12</a:t>
+              <a:t>2015/11/23</a:t>
             </a:fld>
             <a:endParaRPr lang="zh-CN" altLang="en-US"/>
           </a:p>
@@ -2703,7 +2701,7 @@
           <a:p>
             <a:fld id="{CE144EE9-ED3E-4C40-84F5-22B68B55337D}" type="datetimeFigureOut">
               <a:rPr lang="zh-CN" altLang="en-US" smtClean="0"/>
-              <a:t>2015/10/12</a:t>
+              <a:t>2015/11/23</a:t>
             </a:fld>
             <a:endParaRPr lang="zh-CN" altLang="en-US"/>
           </a:p>
@@ -2798,7 +2796,7 @@
           <a:p>
             <a:fld id="{CE144EE9-ED3E-4C40-84F5-22B68B55337D}" type="datetimeFigureOut">
               <a:rPr lang="zh-CN" altLang="en-US" smtClean="0"/>
-              <a:t>2015/10/12</a:t>
+              <a:t>2015/11/23</a:t>
             </a:fld>
             <a:endParaRPr lang="zh-CN" altLang="en-US"/>
           </a:p>
@@ -3075,7 +3073,7 @@
           <a:p>
             <a:fld id="{CE144EE9-ED3E-4C40-84F5-22B68B55337D}" type="datetimeFigureOut">
               <a:rPr lang="zh-CN" altLang="en-US" smtClean="0"/>
-              <a:t>2015/10/12</a:t>
+              <a:t>2015/11/23</a:t>
             </a:fld>
             <a:endParaRPr lang="zh-CN" altLang="en-US"/>
           </a:p>
@@ -3328,7 +3326,7 @@
           <a:p>
             <a:fld id="{CE144EE9-ED3E-4C40-84F5-22B68B55337D}" type="datetimeFigureOut">
               <a:rPr lang="zh-CN" altLang="en-US" smtClean="0"/>
-              <a:t>2015/10/12</a:t>
+              <a:t>2015/11/23</a:t>
             </a:fld>
             <a:endParaRPr lang="zh-CN" altLang="en-US"/>
           </a:p>
@@ -3541,7 +3539,7 @@
           <a:p>
             <a:fld id="{CE144EE9-ED3E-4C40-84F5-22B68B55337D}" type="datetimeFigureOut">
               <a:rPr lang="zh-CN" altLang="en-US" smtClean="0"/>
-              <a:t>2015/10/12</a:t>
+              <a:t>2015/11/23</a:t>
             </a:fld>
             <a:endParaRPr lang="zh-CN" altLang="en-US"/>
           </a:p>
@@ -4968,1921 +4966,6 @@
       </p:cxnSp>
       <p:grpSp>
         <p:nvGrpSpPr>
-          <p:cNvPr id="62" name="组合 61"/>
-          <p:cNvGrpSpPr/>
-          <p:nvPr/>
-        </p:nvGrpSpPr>
-        <p:grpSpPr>
-          <a:xfrm>
-            <a:off x="4720964" y="437055"/>
-            <a:ext cx="2985388" cy="2410304"/>
-            <a:chOff x="346710" y="1540277"/>
-            <a:chExt cx="2985388" cy="2410304"/>
-          </a:xfrm>
-        </p:grpSpPr>
-        <p:grpSp>
-          <p:nvGrpSpPr>
-            <p:cNvPr id="63" name="组合 62"/>
-            <p:cNvGrpSpPr/>
-            <p:nvPr/>
-          </p:nvGrpSpPr>
-          <p:grpSpPr>
-            <a:xfrm>
-              <a:off x="1964499" y="1559637"/>
-              <a:ext cx="906780" cy="586740"/>
-              <a:chOff x="2034540" y="1504950"/>
-              <a:chExt cx="906780" cy="586740"/>
-            </a:xfrm>
-          </p:grpSpPr>
-          <p:sp>
-            <p:nvSpPr>
-              <p:cNvPr id="81" name="圆角矩形 80"/>
-              <p:cNvSpPr/>
-              <p:nvPr/>
-            </p:nvSpPr>
-            <p:spPr>
-              <a:xfrm>
-                <a:off x="2034540" y="1504950"/>
-                <a:ext cx="906780" cy="586740"/>
-              </a:xfrm>
-              <a:prstGeom prst="roundRect">
-                <a:avLst/>
-              </a:prstGeom>
-            </p:spPr>
-            <p:style>
-              <a:lnRef idx="2">
-                <a:schemeClr val="dk1"/>
-              </a:lnRef>
-              <a:fillRef idx="1">
-                <a:schemeClr val="lt1"/>
-              </a:fillRef>
-              <a:effectRef idx="0">
-                <a:schemeClr val="dk1"/>
-              </a:effectRef>
-              <a:fontRef idx="minor">
-                <a:schemeClr val="dk1"/>
-              </a:fontRef>
-            </p:style>
-            <p:txBody>
-              <a:bodyPr rot="0" spcFirstLastPara="0" vert="horz" wrap="square" lIns="91440" tIns="45720" rIns="91440" bIns="45720" numCol="1" spcCol="0" rtlCol="0" fromWordArt="0" anchor="t" anchorCtr="0" forceAA="0" compatLnSpc="1">
-                <a:prstTxWarp prst="textNoShape">
-                  <a:avLst/>
-                </a:prstTxWarp>
-                <a:noAutofit/>
-              </a:bodyPr>
-              <a:lstStyle>
-                <a:defPPr>
-                  <a:defRPr lang="zh-CN"/>
-                </a:defPPr>
-                <a:lvl1pPr marL="0" algn="l" defTabSz="914400" rtl="0" eaLnBrk="1" latinLnBrk="0" hangingPunct="1">
-                  <a:defRPr sz="1800" kern="1200">
-                    <a:solidFill>
-                      <a:schemeClr val="dk1"/>
-                    </a:solidFill>
-                    <a:latin typeface="+mn-lt"/>
-                    <a:ea typeface="+mn-ea"/>
-                    <a:cs typeface="+mn-cs"/>
-                  </a:defRPr>
-                </a:lvl1pPr>
-                <a:lvl2pPr marL="457200" algn="l" defTabSz="914400" rtl="0" eaLnBrk="1" latinLnBrk="0" hangingPunct="1">
-                  <a:defRPr sz="1800" kern="1200">
-                    <a:solidFill>
-                      <a:schemeClr val="dk1"/>
-                    </a:solidFill>
-                    <a:latin typeface="+mn-lt"/>
-                    <a:ea typeface="+mn-ea"/>
-                    <a:cs typeface="+mn-cs"/>
-                  </a:defRPr>
-                </a:lvl2pPr>
-                <a:lvl3pPr marL="914400" algn="l" defTabSz="914400" rtl="0" eaLnBrk="1" latinLnBrk="0" hangingPunct="1">
-                  <a:defRPr sz="1800" kern="1200">
-                    <a:solidFill>
-                      <a:schemeClr val="dk1"/>
-                    </a:solidFill>
-                    <a:latin typeface="+mn-lt"/>
-                    <a:ea typeface="+mn-ea"/>
-                    <a:cs typeface="+mn-cs"/>
-                  </a:defRPr>
-                </a:lvl3pPr>
-                <a:lvl4pPr marL="1371600" algn="l" defTabSz="914400" rtl="0" eaLnBrk="1" latinLnBrk="0" hangingPunct="1">
-                  <a:defRPr sz="1800" kern="1200">
-                    <a:solidFill>
-                      <a:schemeClr val="dk1"/>
-                    </a:solidFill>
-                    <a:latin typeface="+mn-lt"/>
-                    <a:ea typeface="+mn-ea"/>
-                    <a:cs typeface="+mn-cs"/>
-                  </a:defRPr>
-                </a:lvl4pPr>
-                <a:lvl5pPr marL="1828800" algn="l" defTabSz="914400" rtl="0" eaLnBrk="1" latinLnBrk="0" hangingPunct="1">
-                  <a:defRPr sz="1800" kern="1200">
-                    <a:solidFill>
-                      <a:schemeClr val="dk1"/>
-                    </a:solidFill>
-                    <a:latin typeface="+mn-lt"/>
-                    <a:ea typeface="+mn-ea"/>
-                    <a:cs typeface="+mn-cs"/>
-                  </a:defRPr>
-                </a:lvl5pPr>
-                <a:lvl6pPr marL="2286000" algn="l" defTabSz="914400" rtl="0" eaLnBrk="1" latinLnBrk="0" hangingPunct="1">
-                  <a:defRPr sz="1800" kern="1200">
-                    <a:solidFill>
-                      <a:schemeClr val="dk1"/>
-                    </a:solidFill>
-                    <a:latin typeface="+mn-lt"/>
-                    <a:ea typeface="+mn-ea"/>
-                    <a:cs typeface="+mn-cs"/>
-                  </a:defRPr>
-                </a:lvl6pPr>
-                <a:lvl7pPr marL="2743200" algn="l" defTabSz="914400" rtl="0" eaLnBrk="1" latinLnBrk="0" hangingPunct="1">
-                  <a:defRPr sz="1800" kern="1200">
-                    <a:solidFill>
-                      <a:schemeClr val="dk1"/>
-                    </a:solidFill>
-                    <a:latin typeface="+mn-lt"/>
-                    <a:ea typeface="+mn-ea"/>
-                    <a:cs typeface="+mn-cs"/>
-                  </a:defRPr>
-                </a:lvl7pPr>
-                <a:lvl8pPr marL="3200400" algn="l" defTabSz="914400" rtl="0" eaLnBrk="1" latinLnBrk="0" hangingPunct="1">
-                  <a:defRPr sz="1800" kern="1200">
-                    <a:solidFill>
-                      <a:schemeClr val="dk1"/>
-                    </a:solidFill>
-                    <a:latin typeface="+mn-lt"/>
-                    <a:ea typeface="+mn-ea"/>
-                    <a:cs typeface="+mn-cs"/>
-                  </a:defRPr>
-                </a:lvl8pPr>
-                <a:lvl9pPr marL="3657600" algn="l" defTabSz="914400" rtl="0" eaLnBrk="1" latinLnBrk="0" hangingPunct="1">
-                  <a:defRPr sz="1800" kern="1200">
-                    <a:solidFill>
-                      <a:schemeClr val="dk1"/>
-                    </a:solidFill>
-                    <a:latin typeface="+mn-lt"/>
-                    <a:ea typeface="+mn-ea"/>
-                    <a:cs typeface="+mn-cs"/>
-                  </a:defRPr>
-                </a:lvl9pPr>
-              </a:lstStyle>
-              <a:p>
-                <a:pPr algn="ctr"/>
-                <a:r>
-                  <a:rPr lang="en-US" altLang="zh-CN" sz="1200" dirty="0" smtClean="0"/>
-                  <a:t>RM</a:t>
-                </a:r>
-              </a:p>
-            </p:txBody>
-          </p:sp>
-          <p:sp>
-            <p:nvSpPr>
-              <p:cNvPr id="82" name="矩形 81"/>
-              <p:cNvSpPr/>
-              <p:nvPr/>
-            </p:nvSpPr>
-            <p:spPr>
-              <a:xfrm>
-                <a:off x="2202180" y="1798320"/>
-                <a:ext cx="609600" cy="240030"/>
-              </a:xfrm>
-              <a:prstGeom prst="rect">
-                <a:avLst/>
-              </a:prstGeom>
-            </p:spPr>
-            <p:style>
-              <a:lnRef idx="2">
-                <a:schemeClr val="dk1"/>
-              </a:lnRef>
-              <a:fillRef idx="1">
-                <a:schemeClr val="lt1"/>
-              </a:fillRef>
-              <a:effectRef idx="0">
-                <a:schemeClr val="dk1"/>
-              </a:effectRef>
-              <a:fontRef idx="minor">
-                <a:schemeClr val="dk1"/>
-              </a:fontRef>
-            </p:style>
-            <p:txBody>
-              <a:bodyPr rot="0" spcFirstLastPara="0" vert="horz" wrap="square" lIns="91440" tIns="45720" rIns="91440" bIns="45720" numCol="1" spcCol="0" rtlCol="0" fromWordArt="0" anchor="ctr" anchorCtr="0" forceAA="0" compatLnSpc="1">
-                <a:prstTxWarp prst="textNoShape">
-                  <a:avLst/>
-                </a:prstTxWarp>
-                <a:noAutofit/>
-              </a:bodyPr>
-              <a:lstStyle>
-                <a:defPPr>
-                  <a:defRPr lang="zh-CN"/>
-                </a:defPPr>
-                <a:lvl1pPr marL="0" algn="l" defTabSz="914400" rtl="0" eaLnBrk="1" latinLnBrk="0" hangingPunct="1">
-                  <a:defRPr sz="1800" kern="1200">
-                    <a:solidFill>
-                      <a:schemeClr val="dk1"/>
-                    </a:solidFill>
-                    <a:latin typeface="+mn-lt"/>
-                    <a:ea typeface="+mn-ea"/>
-                    <a:cs typeface="+mn-cs"/>
-                  </a:defRPr>
-                </a:lvl1pPr>
-                <a:lvl2pPr marL="457200" algn="l" defTabSz="914400" rtl="0" eaLnBrk="1" latinLnBrk="0" hangingPunct="1">
-                  <a:defRPr sz="1800" kern="1200">
-                    <a:solidFill>
-                      <a:schemeClr val="dk1"/>
-                    </a:solidFill>
-                    <a:latin typeface="+mn-lt"/>
-                    <a:ea typeface="+mn-ea"/>
-                    <a:cs typeface="+mn-cs"/>
-                  </a:defRPr>
-                </a:lvl2pPr>
-                <a:lvl3pPr marL="914400" algn="l" defTabSz="914400" rtl="0" eaLnBrk="1" latinLnBrk="0" hangingPunct="1">
-                  <a:defRPr sz="1800" kern="1200">
-                    <a:solidFill>
-                      <a:schemeClr val="dk1"/>
-                    </a:solidFill>
-                    <a:latin typeface="+mn-lt"/>
-                    <a:ea typeface="+mn-ea"/>
-                    <a:cs typeface="+mn-cs"/>
-                  </a:defRPr>
-                </a:lvl3pPr>
-                <a:lvl4pPr marL="1371600" algn="l" defTabSz="914400" rtl="0" eaLnBrk="1" latinLnBrk="0" hangingPunct="1">
-                  <a:defRPr sz="1800" kern="1200">
-                    <a:solidFill>
-                      <a:schemeClr val="dk1"/>
-                    </a:solidFill>
-                    <a:latin typeface="+mn-lt"/>
-                    <a:ea typeface="+mn-ea"/>
-                    <a:cs typeface="+mn-cs"/>
-                  </a:defRPr>
-                </a:lvl4pPr>
-                <a:lvl5pPr marL="1828800" algn="l" defTabSz="914400" rtl="0" eaLnBrk="1" latinLnBrk="0" hangingPunct="1">
-                  <a:defRPr sz="1800" kern="1200">
-                    <a:solidFill>
-                      <a:schemeClr val="dk1"/>
-                    </a:solidFill>
-                    <a:latin typeface="+mn-lt"/>
-                    <a:ea typeface="+mn-ea"/>
-                    <a:cs typeface="+mn-cs"/>
-                  </a:defRPr>
-                </a:lvl5pPr>
-                <a:lvl6pPr marL="2286000" algn="l" defTabSz="914400" rtl="0" eaLnBrk="1" latinLnBrk="0" hangingPunct="1">
-                  <a:defRPr sz="1800" kern="1200">
-                    <a:solidFill>
-                      <a:schemeClr val="dk1"/>
-                    </a:solidFill>
-                    <a:latin typeface="+mn-lt"/>
-                    <a:ea typeface="+mn-ea"/>
-                    <a:cs typeface="+mn-cs"/>
-                  </a:defRPr>
-                </a:lvl6pPr>
-                <a:lvl7pPr marL="2743200" algn="l" defTabSz="914400" rtl="0" eaLnBrk="1" latinLnBrk="0" hangingPunct="1">
-                  <a:defRPr sz="1800" kern="1200">
-                    <a:solidFill>
-                      <a:schemeClr val="dk1"/>
-                    </a:solidFill>
-                    <a:latin typeface="+mn-lt"/>
-                    <a:ea typeface="+mn-ea"/>
-                    <a:cs typeface="+mn-cs"/>
-                  </a:defRPr>
-                </a:lvl7pPr>
-                <a:lvl8pPr marL="3200400" algn="l" defTabSz="914400" rtl="0" eaLnBrk="1" latinLnBrk="0" hangingPunct="1">
-                  <a:defRPr sz="1800" kern="1200">
-                    <a:solidFill>
-                      <a:schemeClr val="dk1"/>
-                    </a:solidFill>
-                    <a:latin typeface="+mn-lt"/>
-                    <a:ea typeface="+mn-ea"/>
-                    <a:cs typeface="+mn-cs"/>
-                  </a:defRPr>
-                </a:lvl8pPr>
-                <a:lvl9pPr marL="3657600" algn="l" defTabSz="914400" rtl="0" eaLnBrk="1" latinLnBrk="0" hangingPunct="1">
-                  <a:defRPr sz="1800" kern="1200">
-                    <a:solidFill>
-                      <a:schemeClr val="dk1"/>
-                    </a:solidFill>
-                    <a:latin typeface="+mn-lt"/>
-                    <a:ea typeface="+mn-ea"/>
-                    <a:cs typeface="+mn-cs"/>
-                  </a:defRPr>
-                </a:lvl9pPr>
-              </a:lstStyle>
-              <a:p>
-                <a:pPr algn="ctr"/>
-                <a:r>
-                  <a:rPr lang="en-US" altLang="zh-CN" sz="800" dirty="0" smtClean="0"/>
-                  <a:t>Resource Scheduler</a:t>
-                </a:r>
-                <a:endParaRPr lang="zh-CN" altLang="en-US" sz="800" dirty="0"/>
-              </a:p>
-            </p:txBody>
-          </p:sp>
-        </p:grpSp>
-        <p:grpSp>
-          <p:nvGrpSpPr>
-            <p:cNvPr id="64" name="组合 63"/>
-            <p:cNvGrpSpPr/>
-            <p:nvPr/>
-          </p:nvGrpSpPr>
-          <p:grpSpPr>
-            <a:xfrm>
-              <a:off x="1952878" y="3363841"/>
-              <a:ext cx="1379220" cy="586740"/>
-              <a:chOff x="3749040" y="1211580"/>
-              <a:chExt cx="1379220" cy="586740"/>
-            </a:xfrm>
-          </p:grpSpPr>
-          <p:sp>
-            <p:nvSpPr>
-              <p:cNvPr id="78" name="圆角矩形 77"/>
-              <p:cNvSpPr/>
-              <p:nvPr/>
-            </p:nvSpPr>
-            <p:spPr>
-              <a:xfrm>
-                <a:off x="3749040" y="1211580"/>
-                <a:ext cx="1379220" cy="586740"/>
-              </a:xfrm>
-              <a:prstGeom prst="roundRect">
-                <a:avLst/>
-              </a:prstGeom>
-            </p:spPr>
-            <p:style>
-              <a:lnRef idx="2">
-                <a:schemeClr val="dk1"/>
-              </a:lnRef>
-              <a:fillRef idx="1">
-                <a:schemeClr val="lt1"/>
-              </a:fillRef>
-              <a:effectRef idx="0">
-                <a:schemeClr val="dk1"/>
-              </a:effectRef>
-              <a:fontRef idx="minor">
-                <a:schemeClr val="dk1"/>
-              </a:fontRef>
-            </p:style>
-            <p:txBody>
-              <a:bodyPr rot="0" spcFirstLastPara="0" vert="horz" wrap="square" lIns="91440" tIns="45720" rIns="91440" bIns="45720" numCol="1" spcCol="0" rtlCol="0" fromWordArt="0" anchor="t" anchorCtr="0" forceAA="0" compatLnSpc="1">
-                <a:prstTxWarp prst="textNoShape">
-                  <a:avLst/>
-                </a:prstTxWarp>
-                <a:noAutofit/>
-              </a:bodyPr>
-              <a:lstStyle>
-                <a:defPPr>
-                  <a:defRPr lang="zh-CN"/>
-                </a:defPPr>
-                <a:lvl1pPr marL="0" algn="l" defTabSz="914400" rtl="0" eaLnBrk="1" latinLnBrk="0" hangingPunct="1">
-                  <a:defRPr sz="1800" kern="1200">
-                    <a:solidFill>
-                      <a:schemeClr val="dk1"/>
-                    </a:solidFill>
-                    <a:latin typeface="+mn-lt"/>
-                    <a:ea typeface="+mn-ea"/>
-                    <a:cs typeface="+mn-cs"/>
-                  </a:defRPr>
-                </a:lvl1pPr>
-                <a:lvl2pPr marL="457200" algn="l" defTabSz="914400" rtl="0" eaLnBrk="1" latinLnBrk="0" hangingPunct="1">
-                  <a:defRPr sz="1800" kern="1200">
-                    <a:solidFill>
-                      <a:schemeClr val="dk1"/>
-                    </a:solidFill>
-                    <a:latin typeface="+mn-lt"/>
-                    <a:ea typeface="+mn-ea"/>
-                    <a:cs typeface="+mn-cs"/>
-                  </a:defRPr>
-                </a:lvl2pPr>
-                <a:lvl3pPr marL="914400" algn="l" defTabSz="914400" rtl="0" eaLnBrk="1" latinLnBrk="0" hangingPunct="1">
-                  <a:defRPr sz="1800" kern="1200">
-                    <a:solidFill>
-                      <a:schemeClr val="dk1"/>
-                    </a:solidFill>
-                    <a:latin typeface="+mn-lt"/>
-                    <a:ea typeface="+mn-ea"/>
-                    <a:cs typeface="+mn-cs"/>
-                  </a:defRPr>
-                </a:lvl3pPr>
-                <a:lvl4pPr marL="1371600" algn="l" defTabSz="914400" rtl="0" eaLnBrk="1" latinLnBrk="0" hangingPunct="1">
-                  <a:defRPr sz="1800" kern="1200">
-                    <a:solidFill>
-                      <a:schemeClr val="dk1"/>
-                    </a:solidFill>
-                    <a:latin typeface="+mn-lt"/>
-                    <a:ea typeface="+mn-ea"/>
-                    <a:cs typeface="+mn-cs"/>
-                  </a:defRPr>
-                </a:lvl4pPr>
-                <a:lvl5pPr marL="1828800" algn="l" defTabSz="914400" rtl="0" eaLnBrk="1" latinLnBrk="0" hangingPunct="1">
-                  <a:defRPr sz="1800" kern="1200">
-                    <a:solidFill>
-                      <a:schemeClr val="dk1"/>
-                    </a:solidFill>
-                    <a:latin typeface="+mn-lt"/>
-                    <a:ea typeface="+mn-ea"/>
-                    <a:cs typeface="+mn-cs"/>
-                  </a:defRPr>
-                </a:lvl5pPr>
-                <a:lvl6pPr marL="2286000" algn="l" defTabSz="914400" rtl="0" eaLnBrk="1" latinLnBrk="0" hangingPunct="1">
-                  <a:defRPr sz="1800" kern="1200">
-                    <a:solidFill>
-                      <a:schemeClr val="dk1"/>
-                    </a:solidFill>
-                    <a:latin typeface="+mn-lt"/>
-                    <a:ea typeface="+mn-ea"/>
-                    <a:cs typeface="+mn-cs"/>
-                  </a:defRPr>
-                </a:lvl6pPr>
-                <a:lvl7pPr marL="2743200" algn="l" defTabSz="914400" rtl="0" eaLnBrk="1" latinLnBrk="0" hangingPunct="1">
-                  <a:defRPr sz="1800" kern="1200">
-                    <a:solidFill>
-                      <a:schemeClr val="dk1"/>
-                    </a:solidFill>
-                    <a:latin typeface="+mn-lt"/>
-                    <a:ea typeface="+mn-ea"/>
-                    <a:cs typeface="+mn-cs"/>
-                  </a:defRPr>
-                </a:lvl7pPr>
-                <a:lvl8pPr marL="3200400" algn="l" defTabSz="914400" rtl="0" eaLnBrk="1" latinLnBrk="0" hangingPunct="1">
-                  <a:defRPr sz="1800" kern="1200">
-                    <a:solidFill>
-                      <a:schemeClr val="dk1"/>
-                    </a:solidFill>
-                    <a:latin typeface="+mn-lt"/>
-                    <a:ea typeface="+mn-ea"/>
-                    <a:cs typeface="+mn-cs"/>
-                  </a:defRPr>
-                </a:lvl8pPr>
-                <a:lvl9pPr marL="3657600" algn="l" defTabSz="914400" rtl="0" eaLnBrk="1" latinLnBrk="0" hangingPunct="1">
-                  <a:defRPr sz="1800" kern="1200">
-                    <a:solidFill>
-                      <a:schemeClr val="dk1"/>
-                    </a:solidFill>
-                    <a:latin typeface="+mn-lt"/>
-                    <a:ea typeface="+mn-ea"/>
-                    <a:cs typeface="+mn-cs"/>
-                  </a:defRPr>
-                </a:lvl9pPr>
-              </a:lstStyle>
-              <a:p>
-                <a:pPr algn="ctr"/>
-                <a:r>
-                  <a:rPr lang="en-US" altLang="zh-CN" sz="1200" dirty="0" smtClean="0"/>
-                  <a:t>NM</a:t>
-                </a:r>
-              </a:p>
-            </p:txBody>
-          </p:sp>
-          <p:sp>
-            <p:nvSpPr>
-              <p:cNvPr id="79" name="矩形 78"/>
-              <p:cNvSpPr/>
-              <p:nvPr/>
-            </p:nvSpPr>
-            <p:spPr>
-              <a:xfrm>
-                <a:off x="3794760" y="1499235"/>
-                <a:ext cx="609600" cy="240030"/>
-              </a:xfrm>
-              <a:prstGeom prst="rect">
-                <a:avLst/>
-              </a:prstGeom>
-            </p:spPr>
-            <p:style>
-              <a:lnRef idx="2">
-                <a:schemeClr val="dk1"/>
-              </a:lnRef>
-              <a:fillRef idx="1">
-                <a:schemeClr val="lt1"/>
-              </a:fillRef>
-              <a:effectRef idx="0">
-                <a:schemeClr val="dk1"/>
-              </a:effectRef>
-              <a:fontRef idx="minor">
-                <a:schemeClr val="dk1"/>
-              </a:fontRef>
-            </p:style>
-            <p:txBody>
-              <a:bodyPr rot="0" spcFirstLastPara="0" vert="horz" wrap="square" lIns="91440" tIns="45720" rIns="91440" bIns="45720" numCol="1" spcCol="0" rtlCol="0" fromWordArt="0" anchor="ctr" anchorCtr="0" forceAA="0" compatLnSpc="1">
-                <a:prstTxWarp prst="textNoShape">
-                  <a:avLst/>
-                </a:prstTxWarp>
-                <a:noAutofit/>
-              </a:bodyPr>
-              <a:lstStyle>
-                <a:defPPr>
-                  <a:defRPr lang="zh-CN"/>
-                </a:defPPr>
-                <a:lvl1pPr marL="0" algn="l" defTabSz="914400" rtl="0" eaLnBrk="1" latinLnBrk="0" hangingPunct="1">
-                  <a:defRPr sz="1800" kern="1200">
-                    <a:solidFill>
-                      <a:schemeClr val="dk1"/>
-                    </a:solidFill>
-                    <a:latin typeface="+mn-lt"/>
-                    <a:ea typeface="+mn-ea"/>
-                    <a:cs typeface="+mn-cs"/>
-                  </a:defRPr>
-                </a:lvl1pPr>
-                <a:lvl2pPr marL="457200" algn="l" defTabSz="914400" rtl="0" eaLnBrk="1" latinLnBrk="0" hangingPunct="1">
-                  <a:defRPr sz="1800" kern="1200">
-                    <a:solidFill>
-                      <a:schemeClr val="dk1"/>
-                    </a:solidFill>
-                    <a:latin typeface="+mn-lt"/>
-                    <a:ea typeface="+mn-ea"/>
-                    <a:cs typeface="+mn-cs"/>
-                  </a:defRPr>
-                </a:lvl2pPr>
-                <a:lvl3pPr marL="914400" algn="l" defTabSz="914400" rtl="0" eaLnBrk="1" latinLnBrk="0" hangingPunct="1">
-                  <a:defRPr sz="1800" kern="1200">
-                    <a:solidFill>
-                      <a:schemeClr val="dk1"/>
-                    </a:solidFill>
-                    <a:latin typeface="+mn-lt"/>
-                    <a:ea typeface="+mn-ea"/>
-                    <a:cs typeface="+mn-cs"/>
-                  </a:defRPr>
-                </a:lvl3pPr>
-                <a:lvl4pPr marL="1371600" algn="l" defTabSz="914400" rtl="0" eaLnBrk="1" latinLnBrk="0" hangingPunct="1">
-                  <a:defRPr sz="1800" kern="1200">
-                    <a:solidFill>
-                      <a:schemeClr val="dk1"/>
-                    </a:solidFill>
-                    <a:latin typeface="+mn-lt"/>
-                    <a:ea typeface="+mn-ea"/>
-                    <a:cs typeface="+mn-cs"/>
-                  </a:defRPr>
-                </a:lvl4pPr>
-                <a:lvl5pPr marL="1828800" algn="l" defTabSz="914400" rtl="0" eaLnBrk="1" latinLnBrk="0" hangingPunct="1">
-                  <a:defRPr sz="1800" kern="1200">
-                    <a:solidFill>
-                      <a:schemeClr val="dk1"/>
-                    </a:solidFill>
-                    <a:latin typeface="+mn-lt"/>
-                    <a:ea typeface="+mn-ea"/>
-                    <a:cs typeface="+mn-cs"/>
-                  </a:defRPr>
-                </a:lvl5pPr>
-                <a:lvl6pPr marL="2286000" algn="l" defTabSz="914400" rtl="0" eaLnBrk="1" latinLnBrk="0" hangingPunct="1">
-                  <a:defRPr sz="1800" kern="1200">
-                    <a:solidFill>
-                      <a:schemeClr val="dk1"/>
-                    </a:solidFill>
-                    <a:latin typeface="+mn-lt"/>
-                    <a:ea typeface="+mn-ea"/>
-                    <a:cs typeface="+mn-cs"/>
-                  </a:defRPr>
-                </a:lvl6pPr>
-                <a:lvl7pPr marL="2743200" algn="l" defTabSz="914400" rtl="0" eaLnBrk="1" latinLnBrk="0" hangingPunct="1">
-                  <a:defRPr sz="1800" kern="1200">
-                    <a:solidFill>
-                      <a:schemeClr val="dk1"/>
-                    </a:solidFill>
-                    <a:latin typeface="+mn-lt"/>
-                    <a:ea typeface="+mn-ea"/>
-                    <a:cs typeface="+mn-cs"/>
-                  </a:defRPr>
-                </a:lvl7pPr>
-                <a:lvl8pPr marL="3200400" algn="l" defTabSz="914400" rtl="0" eaLnBrk="1" latinLnBrk="0" hangingPunct="1">
-                  <a:defRPr sz="1800" kern="1200">
-                    <a:solidFill>
-                      <a:schemeClr val="dk1"/>
-                    </a:solidFill>
-                    <a:latin typeface="+mn-lt"/>
-                    <a:ea typeface="+mn-ea"/>
-                    <a:cs typeface="+mn-cs"/>
-                  </a:defRPr>
-                </a:lvl8pPr>
-                <a:lvl9pPr marL="3657600" algn="l" defTabSz="914400" rtl="0" eaLnBrk="1" latinLnBrk="0" hangingPunct="1">
-                  <a:defRPr sz="1800" kern="1200">
-                    <a:solidFill>
-                      <a:schemeClr val="dk1"/>
-                    </a:solidFill>
-                    <a:latin typeface="+mn-lt"/>
-                    <a:ea typeface="+mn-ea"/>
-                    <a:cs typeface="+mn-cs"/>
-                  </a:defRPr>
-                </a:lvl9pPr>
-              </a:lstStyle>
-              <a:p>
-                <a:pPr algn="ctr"/>
-                <a:r>
-                  <a:rPr lang="en-US" altLang="zh-CN" sz="800" dirty="0" smtClean="0"/>
-                  <a:t>Container</a:t>
-                </a:r>
-                <a:endParaRPr lang="zh-CN" altLang="en-US" sz="800" dirty="0"/>
-              </a:p>
-            </p:txBody>
-          </p:sp>
-          <p:sp>
-            <p:nvSpPr>
-              <p:cNvPr id="80" name="矩形 79"/>
-              <p:cNvSpPr/>
-              <p:nvPr/>
-            </p:nvSpPr>
-            <p:spPr>
-              <a:xfrm>
-                <a:off x="4438650" y="1499235"/>
-                <a:ext cx="609600" cy="240030"/>
-              </a:xfrm>
-              <a:prstGeom prst="rect">
-                <a:avLst/>
-              </a:prstGeom>
-            </p:spPr>
-            <p:style>
-              <a:lnRef idx="2">
-                <a:schemeClr val="dk1"/>
-              </a:lnRef>
-              <a:fillRef idx="1">
-                <a:schemeClr val="lt1"/>
-              </a:fillRef>
-              <a:effectRef idx="0">
-                <a:schemeClr val="dk1"/>
-              </a:effectRef>
-              <a:fontRef idx="minor">
-                <a:schemeClr val="dk1"/>
-              </a:fontRef>
-            </p:style>
-            <p:txBody>
-              <a:bodyPr rot="0" spcFirstLastPara="0" vert="horz" wrap="square" lIns="91440" tIns="45720" rIns="91440" bIns="45720" numCol="1" spcCol="0" rtlCol="0" fromWordArt="0" anchor="ctr" anchorCtr="0" forceAA="0" compatLnSpc="1">
-                <a:prstTxWarp prst="textNoShape">
-                  <a:avLst/>
-                </a:prstTxWarp>
-                <a:noAutofit/>
-              </a:bodyPr>
-              <a:lstStyle>
-                <a:defPPr>
-                  <a:defRPr lang="zh-CN"/>
-                </a:defPPr>
-                <a:lvl1pPr marL="0" algn="l" defTabSz="914400" rtl="0" eaLnBrk="1" latinLnBrk="0" hangingPunct="1">
-                  <a:defRPr sz="1800" kern="1200">
-                    <a:solidFill>
-                      <a:schemeClr val="dk1"/>
-                    </a:solidFill>
-                    <a:latin typeface="+mn-lt"/>
-                    <a:ea typeface="+mn-ea"/>
-                    <a:cs typeface="+mn-cs"/>
-                  </a:defRPr>
-                </a:lvl1pPr>
-                <a:lvl2pPr marL="457200" algn="l" defTabSz="914400" rtl="0" eaLnBrk="1" latinLnBrk="0" hangingPunct="1">
-                  <a:defRPr sz="1800" kern="1200">
-                    <a:solidFill>
-                      <a:schemeClr val="dk1"/>
-                    </a:solidFill>
-                    <a:latin typeface="+mn-lt"/>
-                    <a:ea typeface="+mn-ea"/>
-                    <a:cs typeface="+mn-cs"/>
-                  </a:defRPr>
-                </a:lvl2pPr>
-                <a:lvl3pPr marL="914400" algn="l" defTabSz="914400" rtl="0" eaLnBrk="1" latinLnBrk="0" hangingPunct="1">
-                  <a:defRPr sz="1800" kern="1200">
-                    <a:solidFill>
-                      <a:schemeClr val="dk1"/>
-                    </a:solidFill>
-                    <a:latin typeface="+mn-lt"/>
-                    <a:ea typeface="+mn-ea"/>
-                    <a:cs typeface="+mn-cs"/>
-                  </a:defRPr>
-                </a:lvl3pPr>
-                <a:lvl4pPr marL="1371600" algn="l" defTabSz="914400" rtl="0" eaLnBrk="1" latinLnBrk="0" hangingPunct="1">
-                  <a:defRPr sz="1800" kern="1200">
-                    <a:solidFill>
-                      <a:schemeClr val="dk1"/>
-                    </a:solidFill>
-                    <a:latin typeface="+mn-lt"/>
-                    <a:ea typeface="+mn-ea"/>
-                    <a:cs typeface="+mn-cs"/>
-                  </a:defRPr>
-                </a:lvl4pPr>
-                <a:lvl5pPr marL="1828800" algn="l" defTabSz="914400" rtl="0" eaLnBrk="1" latinLnBrk="0" hangingPunct="1">
-                  <a:defRPr sz="1800" kern="1200">
-                    <a:solidFill>
-                      <a:schemeClr val="dk1"/>
-                    </a:solidFill>
-                    <a:latin typeface="+mn-lt"/>
-                    <a:ea typeface="+mn-ea"/>
-                    <a:cs typeface="+mn-cs"/>
-                  </a:defRPr>
-                </a:lvl5pPr>
-                <a:lvl6pPr marL="2286000" algn="l" defTabSz="914400" rtl="0" eaLnBrk="1" latinLnBrk="0" hangingPunct="1">
-                  <a:defRPr sz="1800" kern="1200">
-                    <a:solidFill>
-                      <a:schemeClr val="dk1"/>
-                    </a:solidFill>
-                    <a:latin typeface="+mn-lt"/>
-                    <a:ea typeface="+mn-ea"/>
-                    <a:cs typeface="+mn-cs"/>
-                  </a:defRPr>
-                </a:lvl6pPr>
-                <a:lvl7pPr marL="2743200" algn="l" defTabSz="914400" rtl="0" eaLnBrk="1" latinLnBrk="0" hangingPunct="1">
-                  <a:defRPr sz="1800" kern="1200">
-                    <a:solidFill>
-                      <a:schemeClr val="dk1"/>
-                    </a:solidFill>
-                    <a:latin typeface="+mn-lt"/>
-                    <a:ea typeface="+mn-ea"/>
-                    <a:cs typeface="+mn-cs"/>
-                  </a:defRPr>
-                </a:lvl7pPr>
-                <a:lvl8pPr marL="3200400" algn="l" defTabSz="914400" rtl="0" eaLnBrk="1" latinLnBrk="0" hangingPunct="1">
-                  <a:defRPr sz="1800" kern="1200">
-                    <a:solidFill>
-                      <a:schemeClr val="dk1"/>
-                    </a:solidFill>
-                    <a:latin typeface="+mn-lt"/>
-                    <a:ea typeface="+mn-ea"/>
-                    <a:cs typeface="+mn-cs"/>
-                  </a:defRPr>
-                </a:lvl8pPr>
-                <a:lvl9pPr marL="3657600" algn="l" defTabSz="914400" rtl="0" eaLnBrk="1" latinLnBrk="0" hangingPunct="1">
-                  <a:defRPr sz="1800" kern="1200">
-                    <a:solidFill>
-                      <a:schemeClr val="dk1"/>
-                    </a:solidFill>
-                    <a:latin typeface="+mn-lt"/>
-                    <a:ea typeface="+mn-ea"/>
-                    <a:cs typeface="+mn-cs"/>
-                  </a:defRPr>
-                </a:lvl9pPr>
-              </a:lstStyle>
-              <a:p>
-                <a:pPr algn="ctr"/>
-                <a:r>
-                  <a:rPr lang="en-US" altLang="zh-CN" sz="800" dirty="0" smtClean="0"/>
-                  <a:t>Container</a:t>
-                </a:r>
-                <a:endParaRPr lang="zh-CN" altLang="en-US" sz="800" dirty="0"/>
-              </a:p>
-            </p:txBody>
-          </p:sp>
-        </p:grpSp>
-        <p:grpSp>
-          <p:nvGrpSpPr>
-            <p:cNvPr id="65" name="组合 64"/>
-            <p:cNvGrpSpPr/>
-            <p:nvPr/>
-          </p:nvGrpSpPr>
-          <p:grpSpPr>
-            <a:xfrm>
-              <a:off x="1952878" y="2439747"/>
-              <a:ext cx="1379220" cy="586740"/>
-              <a:chOff x="3459480" y="3543300"/>
-              <a:chExt cx="1379220" cy="586740"/>
-            </a:xfrm>
-          </p:grpSpPr>
-          <p:sp>
-            <p:nvSpPr>
-              <p:cNvPr id="75" name="圆角矩形 74"/>
-              <p:cNvSpPr/>
-              <p:nvPr/>
-            </p:nvSpPr>
-            <p:spPr>
-              <a:xfrm>
-                <a:off x="3459480" y="3543300"/>
-                <a:ext cx="1379220" cy="586740"/>
-              </a:xfrm>
-              <a:prstGeom prst="roundRect">
-                <a:avLst/>
-              </a:prstGeom>
-            </p:spPr>
-            <p:style>
-              <a:lnRef idx="2">
-                <a:schemeClr val="dk1"/>
-              </a:lnRef>
-              <a:fillRef idx="1">
-                <a:schemeClr val="lt1"/>
-              </a:fillRef>
-              <a:effectRef idx="0">
-                <a:schemeClr val="dk1"/>
-              </a:effectRef>
-              <a:fontRef idx="minor">
-                <a:schemeClr val="dk1"/>
-              </a:fontRef>
-            </p:style>
-            <p:txBody>
-              <a:bodyPr rot="0" spcFirstLastPara="0" vert="horz" wrap="square" lIns="91440" tIns="45720" rIns="91440" bIns="45720" numCol="1" spcCol="0" rtlCol="0" fromWordArt="0" anchor="t" anchorCtr="0" forceAA="0" compatLnSpc="1">
-                <a:prstTxWarp prst="textNoShape">
-                  <a:avLst/>
-                </a:prstTxWarp>
-                <a:noAutofit/>
-              </a:bodyPr>
-              <a:lstStyle>
-                <a:defPPr>
-                  <a:defRPr lang="zh-CN"/>
-                </a:defPPr>
-                <a:lvl1pPr marL="0" algn="l" defTabSz="914400" rtl="0" eaLnBrk="1" latinLnBrk="0" hangingPunct="1">
-                  <a:defRPr sz="1800" kern="1200">
-                    <a:solidFill>
-                      <a:schemeClr val="dk1"/>
-                    </a:solidFill>
-                    <a:latin typeface="+mn-lt"/>
-                    <a:ea typeface="+mn-ea"/>
-                    <a:cs typeface="+mn-cs"/>
-                  </a:defRPr>
-                </a:lvl1pPr>
-                <a:lvl2pPr marL="457200" algn="l" defTabSz="914400" rtl="0" eaLnBrk="1" latinLnBrk="0" hangingPunct="1">
-                  <a:defRPr sz="1800" kern="1200">
-                    <a:solidFill>
-                      <a:schemeClr val="dk1"/>
-                    </a:solidFill>
-                    <a:latin typeface="+mn-lt"/>
-                    <a:ea typeface="+mn-ea"/>
-                    <a:cs typeface="+mn-cs"/>
-                  </a:defRPr>
-                </a:lvl2pPr>
-                <a:lvl3pPr marL="914400" algn="l" defTabSz="914400" rtl="0" eaLnBrk="1" latinLnBrk="0" hangingPunct="1">
-                  <a:defRPr sz="1800" kern="1200">
-                    <a:solidFill>
-                      <a:schemeClr val="dk1"/>
-                    </a:solidFill>
-                    <a:latin typeface="+mn-lt"/>
-                    <a:ea typeface="+mn-ea"/>
-                    <a:cs typeface="+mn-cs"/>
-                  </a:defRPr>
-                </a:lvl3pPr>
-                <a:lvl4pPr marL="1371600" algn="l" defTabSz="914400" rtl="0" eaLnBrk="1" latinLnBrk="0" hangingPunct="1">
-                  <a:defRPr sz="1800" kern="1200">
-                    <a:solidFill>
-                      <a:schemeClr val="dk1"/>
-                    </a:solidFill>
-                    <a:latin typeface="+mn-lt"/>
-                    <a:ea typeface="+mn-ea"/>
-                    <a:cs typeface="+mn-cs"/>
-                  </a:defRPr>
-                </a:lvl4pPr>
-                <a:lvl5pPr marL="1828800" algn="l" defTabSz="914400" rtl="0" eaLnBrk="1" latinLnBrk="0" hangingPunct="1">
-                  <a:defRPr sz="1800" kern="1200">
-                    <a:solidFill>
-                      <a:schemeClr val="dk1"/>
-                    </a:solidFill>
-                    <a:latin typeface="+mn-lt"/>
-                    <a:ea typeface="+mn-ea"/>
-                    <a:cs typeface="+mn-cs"/>
-                  </a:defRPr>
-                </a:lvl5pPr>
-                <a:lvl6pPr marL="2286000" algn="l" defTabSz="914400" rtl="0" eaLnBrk="1" latinLnBrk="0" hangingPunct="1">
-                  <a:defRPr sz="1800" kern="1200">
-                    <a:solidFill>
-                      <a:schemeClr val="dk1"/>
-                    </a:solidFill>
-                    <a:latin typeface="+mn-lt"/>
-                    <a:ea typeface="+mn-ea"/>
-                    <a:cs typeface="+mn-cs"/>
-                  </a:defRPr>
-                </a:lvl6pPr>
-                <a:lvl7pPr marL="2743200" algn="l" defTabSz="914400" rtl="0" eaLnBrk="1" latinLnBrk="0" hangingPunct="1">
-                  <a:defRPr sz="1800" kern="1200">
-                    <a:solidFill>
-                      <a:schemeClr val="dk1"/>
-                    </a:solidFill>
-                    <a:latin typeface="+mn-lt"/>
-                    <a:ea typeface="+mn-ea"/>
-                    <a:cs typeface="+mn-cs"/>
-                  </a:defRPr>
-                </a:lvl7pPr>
-                <a:lvl8pPr marL="3200400" algn="l" defTabSz="914400" rtl="0" eaLnBrk="1" latinLnBrk="0" hangingPunct="1">
-                  <a:defRPr sz="1800" kern="1200">
-                    <a:solidFill>
-                      <a:schemeClr val="dk1"/>
-                    </a:solidFill>
-                    <a:latin typeface="+mn-lt"/>
-                    <a:ea typeface="+mn-ea"/>
-                    <a:cs typeface="+mn-cs"/>
-                  </a:defRPr>
-                </a:lvl8pPr>
-                <a:lvl9pPr marL="3657600" algn="l" defTabSz="914400" rtl="0" eaLnBrk="1" latinLnBrk="0" hangingPunct="1">
-                  <a:defRPr sz="1800" kern="1200">
-                    <a:solidFill>
-                      <a:schemeClr val="dk1"/>
-                    </a:solidFill>
-                    <a:latin typeface="+mn-lt"/>
-                    <a:ea typeface="+mn-ea"/>
-                    <a:cs typeface="+mn-cs"/>
-                  </a:defRPr>
-                </a:lvl9pPr>
-              </a:lstStyle>
-              <a:p>
-                <a:pPr algn="ctr"/>
-                <a:r>
-                  <a:rPr lang="en-US" altLang="zh-CN" sz="1200" dirty="0" smtClean="0"/>
-                  <a:t>NM</a:t>
-                </a:r>
-              </a:p>
-            </p:txBody>
-          </p:sp>
-          <p:sp>
-            <p:nvSpPr>
-              <p:cNvPr id="76" name="矩形 75"/>
-              <p:cNvSpPr/>
-              <p:nvPr/>
-            </p:nvSpPr>
-            <p:spPr>
-              <a:xfrm>
-                <a:off x="3505200" y="3830955"/>
-                <a:ext cx="609600" cy="240030"/>
-              </a:xfrm>
-              <a:prstGeom prst="rect">
-                <a:avLst/>
-              </a:prstGeom>
-            </p:spPr>
-            <p:style>
-              <a:lnRef idx="2">
-                <a:schemeClr val="dk1"/>
-              </a:lnRef>
-              <a:fillRef idx="1">
-                <a:schemeClr val="lt1"/>
-              </a:fillRef>
-              <a:effectRef idx="0">
-                <a:schemeClr val="dk1"/>
-              </a:effectRef>
-              <a:fontRef idx="minor">
-                <a:schemeClr val="dk1"/>
-              </a:fontRef>
-            </p:style>
-            <p:txBody>
-              <a:bodyPr rot="0" spcFirstLastPara="0" vert="horz" wrap="square" lIns="91440" tIns="45720" rIns="91440" bIns="45720" numCol="1" spcCol="0" rtlCol="0" fromWordArt="0" anchor="ctr" anchorCtr="0" forceAA="0" compatLnSpc="1">
-                <a:prstTxWarp prst="textNoShape">
-                  <a:avLst/>
-                </a:prstTxWarp>
-                <a:noAutofit/>
-              </a:bodyPr>
-              <a:lstStyle>
-                <a:defPPr>
-                  <a:defRPr lang="zh-CN"/>
-                </a:defPPr>
-                <a:lvl1pPr marL="0" algn="l" defTabSz="914400" rtl="0" eaLnBrk="1" latinLnBrk="0" hangingPunct="1">
-                  <a:defRPr sz="1800" kern="1200">
-                    <a:solidFill>
-                      <a:schemeClr val="dk1"/>
-                    </a:solidFill>
-                    <a:latin typeface="+mn-lt"/>
-                    <a:ea typeface="+mn-ea"/>
-                    <a:cs typeface="+mn-cs"/>
-                  </a:defRPr>
-                </a:lvl1pPr>
-                <a:lvl2pPr marL="457200" algn="l" defTabSz="914400" rtl="0" eaLnBrk="1" latinLnBrk="0" hangingPunct="1">
-                  <a:defRPr sz="1800" kern="1200">
-                    <a:solidFill>
-                      <a:schemeClr val="dk1"/>
-                    </a:solidFill>
-                    <a:latin typeface="+mn-lt"/>
-                    <a:ea typeface="+mn-ea"/>
-                    <a:cs typeface="+mn-cs"/>
-                  </a:defRPr>
-                </a:lvl2pPr>
-                <a:lvl3pPr marL="914400" algn="l" defTabSz="914400" rtl="0" eaLnBrk="1" latinLnBrk="0" hangingPunct="1">
-                  <a:defRPr sz="1800" kern="1200">
-                    <a:solidFill>
-                      <a:schemeClr val="dk1"/>
-                    </a:solidFill>
-                    <a:latin typeface="+mn-lt"/>
-                    <a:ea typeface="+mn-ea"/>
-                    <a:cs typeface="+mn-cs"/>
-                  </a:defRPr>
-                </a:lvl3pPr>
-                <a:lvl4pPr marL="1371600" algn="l" defTabSz="914400" rtl="0" eaLnBrk="1" latinLnBrk="0" hangingPunct="1">
-                  <a:defRPr sz="1800" kern="1200">
-                    <a:solidFill>
-                      <a:schemeClr val="dk1"/>
-                    </a:solidFill>
-                    <a:latin typeface="+mn-lt"/>
-                    <a:ea typeface="+mn-ea"/>
-                    <a:cs typeface="+mn-cs"/>
-                  </a:defRPr>
-                </a:lvl4pPr>
-                <a:lvl5pPr marL="1828800" algn="l" defTabSz="914400" rtl="0" eaLnBrk="1" latinLnBrk="0" hangingPunct="1">
-                  <a:defRPr sz="1800" kern="1200">
-                    <a:solidFill>
-                      <a:schemeClr val="dk1"/>
-                    </a:solidFill>
-                    <a:latin typeface="+mn-lt"/>
-                    <a:ea typeface="+mn-ea"/>
-                    <a:cs typeface="+mn-cs"/>
-                  </a:defRPr>
-                </a:lvl5pPr>
-                <a:lvl6pPr marL="2286000" algn="l" defTabSz="914400" rtl="0" eaLnBrk="1" latinLnBrk="0" hangingPunct="1">
-                  <a:defRPr sz="1800" kern="1200">
-                    <a:solidFill>
-                      <a:schemeClr val="dk1"/>
-                    </a:solidFill>
-                    <a:latin typeface="+mn-lt"/>
-                    <a:ea typeface="+mn-ea"/>
-                    <a:cs typeface="+mn-cs"/>
-                  </a:defRPr>
-                </a:lvl6pPr>
-                <a:lvl7pPr marL="2743200" algn="l" defTabSz="914400" rtl="0" eaLnBrk="1" latinLnBrk="0" hangingPunct="1">
-                  <a:defRPr sz="1800" kern="1200">
-                    <a:solidFill>
-                      <a:schemeClr val="dk1"/>
-                    </a:solidFill>
-                    <a:latin typeface="+mn-lt"/>
-                    <a:ea typeface="+mn-ea"/>
-                    <a:cs typeface="+mn-cs"/>
-                  </a:defRPr>
-                </a:lvl7pPr>
-                <a:lvl8pPr marL="3200400" algn="l" defTabSz="914400" rtl="0" eaLnBrk="1" latinLnBrk="0" hangingPunct="1">
-                  <a:defRPr sz="1800" kern="1200">
-                    <a:solidFill>
-                      <a:schemeClr val="dk1"/>
-                    </a:solidFill>
-                    <a:latin typeface="+mn-lt"/>
-                    <a:ea typeface="+mn-ea"/>
-                    <a:cs typeface="+mn-cs"/>
-                  </a:defRPr>
-                </a:lvl8pPr>
-                <a:lvl9pPr marL="3657600" algn="l" defTabSz="914400" rtl="0" eaLnBrk="1" latinLnBrk="0" hangingPunct="1">
-                  <a:defRPr sz="1800" kern="1200">
-                    <a:solidFill>
-                      <a:schemeClr val="dk1"/>
-                    </a:solidFill>
-                    <a:latin typeface="+mn-lt"/>
-                    <a:ea typeface="+mn-ea"/>
-                    <a:cs typeface="+mn-cs"/>
-                  </a:defRPr>
-                </a:lvl9pPr>
-              </a:lstStyle>
-              <a:p>
-                <a:pPr algn="ctr"/>
-                <a:r>
-                  <a:rPr lang="en-US" altLang="zh-CN" sz="800" dirty="0" err="1" smtClean="0"/>
-                  <a:t>AppMstr</a:t>
-                </a:r>
-                <a:endParaRPr lang="zh-CN" altLang="en-US" sz="800" dirty="0"/>
-              </a:p>
-            </p:txBody>
-          </p:sp>
-          <p:sp>
-            <p:nvSpPr>
-              <p:cNvPr id="77" name="矩形 76"/>
-              <p:cNvSpPr/>
-              <p:nvPr/>
-            </p:nvSpPr>
-            <p:spPr>
-              <a:xfrm>
-                <a:off x="4149090" y="3830955"/>
-                <a:ext cx="609600" cy="240030"/>
-              </a:xfrm>
-              <a:prstGeom prst="rect">
-                <a:avLst/>
-              </a:prstGeom>
-            </p:spPr>
-            <p:style>
-              <a:lnRef idx="2">
-                <a:schemeClr val="dk1"/>
-              </a:lnRef>
-              <a:fillRef idx="1">
-                <a:schemeClr val="lt1"/>
-              </a:fillRef>
-              <a:effectRef idx="0">
-                <a:schemeClr val="dk1"/>
-              </a:effectRef>
-              <a:fontRef idx="minor">
-                <a:schemeClr val="dk1"/>
-              </a:fontRef>
-            </p:style>
-            <p:txBody>
-              <a:bodyPr rot="0" spcFirstLastPara="0" vert="horz" wrap="square" lIns="91440" tIns="45720" rIns="91440" bIns="45720" numCol="1" spcCol="0" rtlCol="0" fromWordArt="0" anchor="ctr" anchorCtr="0" forceAA="0" compatLnSpc="1">
-                <a:prstTxWarp prst="textNoShape">
-                  <a:avLst/>
-                </a:prstTxWarp>
-                <a:noAutofit/>
-              </a:bodyPr>
-              <a:lstStyle>
-                <a:defPPr>
-                  <a:defRPr lang="zh-CN"/>
-                </a:defPPr>
-                <a:lvl1pPr marL="0" algn="l" defTabSz="914400" rtl="0" eaLnBrk="1" latinLnBrk="0" hangingPunct="1">
-                  <a:defRPr sz="1800" kern="1200">
-                    <a:solidFill>
-                      <a:schemeClr val="dk1"/>
-                    </a:solidFill>
-                    <a:latin typeface="+mn-lt"/>
-                    <a:ea typeface="+mn-ea"/>
-                    <a:cs typeface="+mn-cs"/>
-                  </a:defRPr>
-                </a:lvl1pPr>
-                <a:lvl2pPr marL="457200" algn="l" defTabSz="914400" rtl="0" eaLnBrk="1" latinLnBrk="0" hangingPunct="1">
-                  <a:defRPr sz="1800" kern="1200">
-                    <a:solidFill>
-                      <a:schemeClr val="dk1"/>
-                    </a:solidFill>
-                    <a:latin typeface="+mn-lt"/>
-                    <a:ea typeface="+mn-ea"/>
-                    <a:cs typeface="+mn-cs"/>
-                  </a:defRPr>
-                </a:lvl2pPr>
-                <a:lvl3pPr marL="914400" algn="l" defTabSz="914400" rtl="0" eaLnBrk="1" latinLnBrk="0" hangingPunct="1">
-                  <a:defRPr sz="1800" kern="1200">
-                    <a:solidFill>
-                      <a:schemeClr val="dk1"/>
-                    </a:solidFill>
-                    <a:latin typeface="+mn-lt"/>
-                    <a:ea typeface="+mn-ea"/>
-                    <a:cs typeface="+mn-cs"/>
-                  </a:defRPr>
-                </a:lvl3pPr>
-                <a:lvl4pPr marL="1371600" algn="l" defTabSz="914400" rtl="0" eaLnBrk="1" latinLnBrk="0" hangingPunct="1">
-                  <a:defRPr sz="1800" kern="1200">
-                    <a:solidFill>
-                      <a:schemeClr val="dk1"/>
-                    </a:solidFill>
-                    <a:latin typeface="+mn-lt"/>
-                    <a:ea typeface="+mn-ea"/>
-                    <a:cs typeface="+mn-cs"/>
-                  </a:defRPr>
-                </a:lvl4pPr>
-                <a:lvl5pPr marL="1828800" algn="l" defTabSz="914400" rtl="0" eaLnBrk="1" latinLnBrk="0" hangingPunct="1">
-                  <a:defRPr sz="1800" kern="1200">
-                    <a:solidFill>
-                      <a:schemeClr val="dk1"/>
-                    </a:solidFill>
-                    <a:latin typeface="+mn-lt"/>
-                    <a:ea typeface="+mn-ea"/>
-                    <a:cs typeface="+mn-cs"/>
-                  </a:defRPr>
-                </a:lvl5pPr>
-                <a:lvl6pPr marL="2286000" algn="l" defTabSz="914400" rtl="0" eaLnBrk="1" latinLnBrk="0" hangingPunct="1">
-                  <a:defRPr sz="1800" kern="1200">
-                    <a:solidFill>
-                      <a:schemeClr val="dk1"/>
-                    </a:solidFill>
-                    <a:latin typeface="+mn-lt"/>
-                    <a:ea typeface="+mn-ea"/>
-                    <a:cs typeface="+mn-cs"/>
-                  </a:defRPr>
-                </a:lvl6pPr>
-                <a:lvl7pPr marL="2743200" algn="l" defTabSz="914400" rtl="0" eaLnBrk="1" latinLnBrk="0" hangingPunct="1">
-                  <a:defRPr sz="1800" kern="1200">
-                    <a:solidFill>
-                      <a:schemeClr val="dk1"/>
-                    </a:solidFill>
-                    <a:latin typeface="+mn-lt"/>
-                    <a:ea typeface="+mn-ea"/>
-                    <a:cs typeface="+mn-cs"/>
-                  </a:defRPr>
-                </a:lvl7pPr>
-                <a:lvl8pPr marL="3200400" algn="l" defTabSz="914400" rtl="0" eaLnBrk="1" latinLnBrk="0" hangingPunct="1">
-                  <a:defRPr sz="1800" kern="1200">
-                    <a:solidFill>
-                      <a:schemeClr val="dk1"/>
-                    </a:solidFill>
-                    <a:latin typeface="+mn-lt"/>
-                    <a:ea typeface="+mn-ea"/>
-                    <a:cs typeface="+mn-cs"/>
-                  </a:defRPr>
-                </a:lvl8pPr>
-                <a:lvl9pPr marL="3657600" algn="l" defTabSz="914400" rtl="0" eaLnBrk="1" latinLnBrk="0" hangingPunct="1">
-                  <a:defRPr sz="1800" kern="1200">
-                    <a:solidFill>
-                      <a:schemeClr val="dk1"/>
-                    </a:solidFill>
-                    <a:latin typeface="+mn-lt"/>
-                    <a:ea typeface="+mn-ea"/>
-                    <a:cs typeface="+mn-cs"/>
-                  </a:defRPr>
-                </a:lvl9pPr>
-              </a:lstStyle>
-              <a:p>
-                <a:pPr algn="ctr"/>
-                <a:r>
-                  <a:rPr lang="en-US" altLang="zh-CN" sz="800" dirty="0" smtClean="0"/>
-                  <a:t>Container</a:t>
-                </a:r>
-                <a:endParaRPr lang="zh-CN" altLang="en-US" sz="800" dirty="0"/>
-              </a:p>
-            </p:txBody>
-          </p:sp>
-        </p:grpSp>
-        <p:sp>
-          <p:nvSpPr>
-            <p:cNvPr id="66" name="圆角矩形 65"/>
-            <p:cNvSpPr/>
-            <p:nvPr/>
-          </p:nvSpPr>
-          <p:spPr>
-            <a:xfrm>
-              <a:off x="346710" y="1540277"/>
-              <a:ext cx="982980" cy="685242"/>
-            </a:xfrm>
-            <a:prstGeom prst="roundRect">
-              <a:avLst/>
-            </a:prstGeom>
-          </p:spPr>
-          <p:style>
-            <a:lnRef idx="2">
-              <a:schemeClr val="dk1"/>
-            </a:lnRef>
-            <a:fillRef idx="1">
-              <a:schemeClr val="lt1"/>
-            </a:fillRef>
-            <a:effectRef idx="0">
-              <a:schemeClr val="dk1"/>
-            </a:effectRef>
-            <a:fontRef idx="minor">
-              <a:schemeClr val="dk1"/>
-            </a:fontRef>
-          </p:style>
-          <p:txBody>
-            <a:bodyPr rot="0" spcFirstLastPara="0" vert="horz" wrap="square" lIns="91440" tIns="45720" rIns="91440" bIns="45720" numCol="1" spcCol="0" rtlCol="0" fromWordArt="0" anchor="ctr" anchorCtr="0" forceAA="0" compatLnSpc="1">
-              <a:prstTxWarp prst="textNoShape">
-                <a:avLst/>
-              </a:prstTxWarp>
-              <a:noAutofit/>
-            </a:bodyPr>
-            <a:lstStyle>
-              <a:defPPr>
-                <a:defRPr lang="zh-CN"/>
-              </a:defPPr>
-              <a:lvl1pPr marL="0" algn="l" defTabSz="914400" rtl="0" eaLnBrk="1" latinLnBrk="0" hangingPunct="1">
-                <a:defRPr sz="1800" kern="1200">
-                  <a:solidFill>
-                    <a:schemeClr val="dk1"/>
-                  </a:solidFill>
-                  <a:latin typeface="+mn-lt"/>
-                  <a:ea typeface="+mn-ea"/>
-                  <a:cs typeface="+mn-cs"/>
-                </a:defRPr>
-              </a:lvl1pPr>
-              <a:lvl2pPr marL="457200" algn="l" defTabSz="914400" rtl="0" eaLnBrk="1" latinLnBrk="0" hangingPunct="1">
-                <a:defRPr sz="1800" kern="1200">
-                  <a:solidFill>
-                    <a:schemeClr val="dk1"/>
-                  </a:solidFill>
-                  <a:latin typeface="+mn-lt"/>
-                  <a:ea typeface="+mn-ea"/>
-                  <a:cs typeface="+mn-cs"/>
-                </a:defRPr>
-              </a:lvl2pPr>
-              <a:lvl3pPr marL="914400" algn="l" defTabSz="914400" rtl="0" eaLnBrk="1" latinLnBrk="0" hangingPunct="1">
-                <a:defRPr sz="1800" kern="1200">
-                  <a:solidFill>
-                    <a:schemeClr val="dk1"/>
-                  </a:solidFill>
-                  <a:latin typeface="+mn-lt"/>
-                  <a:ea typeface="+mn-ea"/>
-                  <a:cs typeface="+mn-cs"/>
-                </a:defRPr>
-              </a:lvl3pPr>
-              <a:lvl4pPr marL="1371600" algn="l" defTabSz="914400" rtl="0" eaLnBrk="1" latinLnBrk="0" hangingPunct="1">
-                <a:defRPr sz="1800" kern="1200">
-                  <a:solidFill>
-                    <a:schemeClr val="dk1"/>
-                  </a:solidFill>
-                  <a:latin typeface="+mn-lt"/>
-                  <a:ea typeface="+mn-ea"/>
-                  <a:cs typeface="+mn-cs"/>
-                </a:defRPr>
-              </a:lvl4pPr>
-              <a:lvl5pPr marL="1828800" algn="l" defTabSz="914400" rtl="0" eaLnBrk="1" latinLnBrk="0" hangingPunct="1">
-                <a:defRPr sz="1800" kern="1200">
-                  <a:solidFill>
-                    <a:schemeClr val="dk1"/>
-                  </a:solidFill>
-                  <a:latin typeface="+mn-lt"/>
-                  <a:ea typeface="+mn-ea"/>
-                  <a:cs typeface="+mn-cs"/>
-                </a:defRPr>
-              </a:lvl5pPr>
-              <a:lvl6pPr marL="2286000" algn="l" defTabSz="914400" rtl="0" eaLnBrk="1" latinLnBrk="0" hangingPunct="1">
-                <a:defRPr sz="1800" kern="1200">
-                  <a:solidFill>
-                    <a:schemeClr val="dk1"/>
-                  </a:solidFill>
-                  <a:latin typeface="+mn-lt"/>
-                  <a:ea typeface="+mn-ea"/>
-                  <a:cs typeface="+mn-cs"/>
-                </a:defRPr>
-              </a:lvl6pPr>
-              <a:lvl7pPr marL="2743200" algn="l" defTabSz="914400" rtl="0" eaLnBrk="1" latinLnBrk="0" hangingPunct="1">
-                <a:defRPr sz="1800" kern="1200">
-                  <a:solidFill>
-                    <a:schemeClr val="dk1"/>
-                  </a:solidFill>
-                  <a:latin typeface="+mn-lt"/>
-                  <a:ea typeface="+mn-ea"/>
-                  <a:cs typeface="+mn-cs"/>
-                </a:defRPr>
-              </a:lvl7pPr>
-              <a:lvl8pPr marL="3200400" algn="l" defTabSz="914400" rtl="0" eaLnBrk="1" latinLnBrk="0" hangingPunct="1">
-                <a:defRPr sz="1800" kern="1200">
-                  <a:solidFill>
-                    <a:schemeClr val="dk1"/>
-                  </a:solidFill>
-                  <a:latin typeface="+mn-lt"/>
-                  <a:ea typeface="+mn-ea"/>
-                  <a:cs typeface="+mn-cs"/>
-                </a:defRPr>
-              </a:lvl8pPr>
-              <a:lvl9pPr marL="3657600" algn="l" defTabSz="914400" rtl="0" eaLnBrk="1" latinLnBrk="0" hangingPunct="1">
-                <a:defRPr sz="1800" kern="1200">
-                  <a:solidFill>
-                    <a:schemeClr val="dk1"/>
-                  </a:solidFill>
-                  <a:latin typeface="+mn-lt"/>
-                  <a:ea typeface="+mn-ea"/>
-                  <a:cs typeface="+mn-cs"/>
-                </a:defRPr>
-              </a:lvl9pPr>
-            </a:lstStyle>
-            <a:p>
-              <a:pPr algn="ctr"/>
-              <a:r>
-                <a:rPr lang="en-US" altLang="zh-CN" sz="1000" dirty="0" smtClean="0"/>
-                <a:t>Name Service</a:t>
-              </a:r>
-              <a:endParaRPr lang="zh-CN" altLang="en-US" sz="1000" dirty="0"/>
-            </a:p>
-          </p:txBody>
-        </p:sp>
-        <p:cxnSp>
-          <p:nvCxnSpPr>
-            <p:cNvPr id="67" name="直接箭头连接符 66"/>
-            <p:cNvCxnSpPr>
-              <a:stCxn id="68" idx="0"/>
-              <a:endCxn id="66" idx="2"/>
-            </p:cNvCxnSpPr>
-            <p:nvPr/>
-          </p:nvCxnSpPr>
-          <p:spPr>
-            <a:xfrm flipV="1">
-              <a:off x="733265" y="2225519"/>
-              <a:ext cx="104935" cy="551871"/>
-            </a:xfrm>
-            <a:prstGeom prst="straightConnector1">
-              <a:avLst/>
-            </a:prstGeom>
-            <a:ln>
-              <a:tailEnd type="triangle"/>
-            </a:ln>
-          </p:spPr>
-          <p:style>
-            <a:lnRef idx="1">
-              <a:schemeClr val="dk1"/>
-            </a:lnRef>
-            <a:fillRef idx="0">
-              <a:schemeClr val="dk1"/>
-            </a:fillRef>
-            <a:effectRef idx="0">
-              <a:schemeClr val="dk1"/>
-            </a:effectRef>
-            <a:fontRef idx="minor">
-              <a:schemeClr val="tx1"/>
-            </a:fontRef>
-          </p:style>
-        </p:cxnSp>
-        <p:sp>
-          <p:nvSpPr>
-            <p:cNvPr id="68" name="椭圆 67"/>
-            <p:cNvSpPr/>
-            <p:nvPr/>
-          </p:nvSpPr>
-          <p:spPr>
-            <a:xfrm>
-              <a:off x="348548" y="2777390"/>
-              <a:ext cx="769434" cy="546409"/>
-            </a:xfrm>
-            <a:prstGeom prst="ellipse">
-              <a:avLst/>
-            </a:prstGeom>
-          </p:spPr>
-          <p:style>
-            <a:lnRef idx="2">
-              <a:schemeClr val="dk1"/>
-            </a:lnRef>
-            <a:fillRef idx="1">
-              <a:schemeClr val="lt1"/>
-            </a:fillRef>
-            <a:effectRef idx="0">
-              <a:schemeClr val="dk1"/>
-            </a:effectRef>
-            <a:fontRef idx="minor">
-              <a:schemeClr val="dk1"/>
-            </a:fontRef>
-          </p:style>
-          <p:txBody>
-            <a:bodyPr rot="0" spcFirstLastPara="0" vert="horz" wrap="square" lIns="91440" tIns="45720" rIns="91440" bIns="45720" numCol="1" spcCol="0" rtlCol="0" fromWordArt="0" anchor="ctr" anchorCtr="0" forceAA="0" compatLnSpc="1">
-              <a:prstTxWarp prst="textNoShape">
-                <a:avLst/>
-              </a:prstTxWarp>
-              <a:noAutofit/>
-            </a:bodyPr>
-            <a:lstStyle>
-              <a:defPPr>
-                <a:defRPr lang="zh-CN"/>
-              </a:defPPr>
-              <a:lvl1pPr marL="0" algn="l" defTabSz="914400" rtl="0" eaLnBrk="1" latinLnBrk="0" hangingPunct="1">
-                <a:defRPr sz="1800" kern="1200">
-                  <a:solidFill>
-                    <a:schemeClr val="dk1"/>
-                  </a:solidFill>
-                  <a:latin typeface="+mn-lt"/>
-                  <a:ea typeface="+mn-ea"/>
-                  <a:cs typeface="+mn-cs"/>
-                </a:defRPr>
-              </a:lvl1pPr>
-              <a:lvl2pPr marL="457200" algn="l" defTabSz="914400" rtl="0" eaLnBrk="1" latinLnBrk="0" hangingPunct="1">
-                <a:defRPr sz="1800" kern="1200">
-                  <a:solidFill>
-                    <a:schemeClr val="dk1"/>
-                  </a:solidFill>
-                  <a:latin typeface="+mn-lt"/>
-                  <a:ea typeface="+mn-ea"/>
-                  <a:cs typeface="+mn-cs"/>
-                </a:defRPr>
-              </a:lvl2pPr>
-              <a:lvl3pPr marL="914400" algn="l" defTabSz="914400" rtl="0" eaLnBrk="1" latinLnBrk="0" hangingPunct="1">
-                <a:defRPr sz="1800" kern="1200">
-                  <a:solidFill>
-                    <a:schemeClr val="dk1"/>
-                  </a:solidFill>
-                  <a:latin typeface="+mn-lt"/>
-                  <a:ea typeface="+mn-ea"/>
-                  <a:cs typeface="+mn-cs"/>
-                </a:defRPr>
-              </a:lvl3pPr>
-              <a:lvl4pPr marL="1371600" algn="l" defTabSz="914400" rtl="0" eaLnBrk="1" latinLnBrk="0" hangingPunct="1">
-                <a:defRPr sz="1800" kern="1200">
-                  <a:solidFill>
-                    <a:schemeClr val="dk1"/>
-                  </a:solidFill>
-                  <a:latin typeface="+mn-lt"/>
-                  <a:ea typeface="+mn-ea"/>
-                  <a:cs typeface="+mn-cs"/>
-                </a:defRPr>
-              </a:lvl4pPr>
-              <a:lvl5pPr marL="1828800" algn="l" defTabSz="914400" rtl="0" eaLnBrk="1" latinLnBrk="0" hangingPunct="1">
-                <a:defRPr sz="1800" kern="1200">
-                  <a:solidFill>
-                    <a:schemeClr val="dk1"/>
-                  </a:solidFill>
-                  <a:latin typeface="+mn-lt"/>
-                  <a:ea typeface="+mn-ea"/>
-                  <a:cs typeface="+mn-cs"/>
-                </a:defRPr>
-              </a:lvl5pPr>
-              <a:lvl6pPr marL="2286000" algn="l" defTabSz="914400" rtl="0" eaLnBrk="1" latinLnBrk="0" hangingPunct="1">
-                <a:defRPr sz="1800" kern="1200">
-                  <a:solidFill>
-                    <a:schemeClr val="dk1"/>
-                  </a:solidFill>
-                  <a:latin typeface="+mn-lt"/>
-                  <a:ea typeface="+mn-ea"/>
-                  <a:cs typeface="+mn-cs"/>
-                </a:defRPr>
-              </a:lvl6pPr>
-              <a:lvl7pPr marL="2743200" algn="l" defTabSz="914400" rtl="0" eaLnBrk="1" latinLnBrk="0" hangingPunct="1">
-                <a:defRPr sz="1800" kern="1200">
-                  <a:solidFill>
-                    <a:schemeClr val="dk1"/>
-                  </a:solidFill>
-                  <a:latin typeface="+mn-lt"/>
-                  <a:ea typeface="+mn-ea"/>
-                  <a:cs typeface="+mn-cs"/>
-                </a:defRPr>
-              </a:lvl7pPr>
-              <a:lvl8pPr marL="3200400" algn="l" defTabSz="914400" rtl="0" eaLnBrk="1" latinLnBrk="0" hangingPunct="1">
-                <a:defRPr sz="1800" kern="1200">
-                  <a:solidFill>
-                    <a:schemeClr val="dk1"/>
-                  </a:solidFill>
-                  <a:latin typeface="+mn-lt"/>
-                  <a:ea typeface="+mn-ea"/>
-                  <a:cs typeface="+mn-cs"/>
-                </a:defRPr>
-              </a:lvl8pPr>
-              <a:lvl9pPr marL="3657600" algn="l" defTabSz="914400" rtl="0" eaLnBrk="1" latinLnBrk="0" hangingPunct="1">
-                <a:defRPr sz="1800" kern="1200">
-                  <a:solidFill>
-                    <a:schemeClr val="dk1"/>
-                  </a:solidFill>
-                  <a:latin typeface="+mn-lt"/>
-                  <a:ea typeface="+mn-ea"/>
-                  <a:cs typeface="+mn-cs"/>
-                </a:defRPr>
-              </a:lvl9pPr>
-            </a:lstStyle>
-            <a:p>
-              <a:pPr algn="ctr"/>
-              <a:r>
-                <a:rPr lang="en-US" altLang="zh-CN" sz="1000" dirty="0" smtClean="0">
-                  <a:latin typeface="Times New Roman" panose="02020603050405020304" pitchFamily="18" charset="0"/>
-                  <a:cs typeface="Times New Roman" panose="02020603050405020304" pitchFamily="18" charset="0"/>
-                </a:rPr>
-                <a:t>Client</a:t>
-              </a:r>
-              <a:endParaRPr lang="zh-CN" altLang="en-US" sz="1000" dirty="0">
-                <a:latin typeface="Times New Roman" panose="02020603050405020304" pitchFamily="18" charset="0"/>
-                <a:cs typeface="Times New Roman" panose="02020603050405020304" pitchFamily="18" charset="0"/>
-              </a:endParaRPr>
-            </a:p>
-          </p:txBody>
-        </p:sp>
-        <p:sp>
-          <p:nvSpPr>
-            <p:cNvPr id="69" name="文本框 37"/>
-            <p:cNvSpPr txBox="1"/>
-            <p:nvPr/>
-          </p:nvSpPr>
-          <p:spPr>
-            <a:xfrm>
-              <a:off x="733265" y="2402840"/>
-              <a:ext cx="272670" cy="246221"/>
-            </a:xfrm>
-            <a:prstGeom prst="rect">
-              <a:avLst/>
-            </a:prstGeom>
-            <a:noFill/>
-          </p:spPr>
-          <p:txBody>
-            <a:bodyPr wrap="square" rtlCol="0">
-              <a:spAutoFit/>
-            </a:bodyPr>
-            <a:lstStyle>
-              <a:defPPr>
-                <a:defRPr lang="zh-CN"/>
-              </a:defPPr>
-              <a:lvl1pPr marL="0" algn="l" defTabSz="914400" rtl="0" eaLnBrk="1" latinLnBrk="0" hangingPunct="1">
-                <a:defRPr sz="1800" kern="1200">
-                  <a:solidFill>
-                    <a:schemeClr val="tx1"/>
-                  </a:solidFill>
-                  <a:latin typeface="+mn-lt"/>
-                  <a:ea typeface="+mn-ea"/>
-                  <a:cs typeface="+mn-cs"/>
-                </a:defRPr>
-              </a:lvl1pPr>
-              <a:lvl2pPr marL="457200" algn="l" defTabSz="914400" rtl="0" eaLnBrk="1" latinLnBrk="0" hangingPunct="1">
-                <a:defRPr sz="1800" kern="1200">
-                  <a:solidFill>
-                    <a:schemeClr val="tx1"/>
-                  </a:solidFill>
-                  <a:latin typeface="+mn-lt"/>
-                  <a:ea typeface="+mn-ea"/>
-                  <a:cs typeface="+mn-cs"/>
-                </a:defRPr>
-              </a:lvl2pPr>
-              <a:lvl3pPr marL="914400" algn="l" defTabSz="914400" rtl="0" eaLnBrk="1" latinLnBrk="0" hangingPunct="1">
-                <a:defRPr sz="1800" kern="1200">
-                  <a:solidFill>
-                    <a:schemeClr val="tx1"/>
-                  </a:solidFill>
-                  <a:latin typeface="+mn-lt"/>
-                  <a:ea typeface="+mn-ea"/>
-                  <a:cs typeface="+mn-cs"/>
-                </a:defRPr>
-              </a:lvl3pPr>
-              <a:lvl4pPr marL="1371600" algn="l" defTabSz="914400" rtl="0" eaLnBrk="1" latinLnBrk="0" hangingPunct="1">
-                <a:defRPr sz="1800" kern="1200">
-                  <a:solidFill>
-                    <a:schemeClr val="tx1"/>
-                  </a:solidFill>
-                  <a:latin typeface="+mn-lt"/>
-                  <a:ea typeface="+mn-ea"/>
-                  <a:cs typeface="+mn-cs"/>
-                </a:defRPr>
-              </a:lvl4pPr>
-              <a:lvl5pPr marL="1828800" algn="l" defTabSz="914400" rtl="0" eaLnBrk="1" latinLnBrk="0" hangingPunct="1">
-                <a:defRPr sz="1800" kern="1200">
-                  <a:solidFill>
-                    <a:schemeClr val="tx1"/>
-                  </a:solidFill>
-                  <a:latin typeface="+mn-lt"/>
-                  <a:ea typeface="+mn-ea"/>
-                  <a:cs typeface="+mn-cs"/>
-                </a:defRPr>
-              </a:lvl5pPr>
-              <a:lvl6pPr marL="2286000" algn="l" defTabSz="914400" rtl="0" eaLnBrk="1" latinLnBrk="0" hangingPunct="1">
-                <a:defRPr sz="1800" kern="1200">
-                  <a:solidFill>
-                    <a:schemeClr val="tx1"/>
-                  </a:solidFill>
-                  <a:latin typeface="+mn-lt"/>
-                  <a:ea typeface="+mn-ea"/>
-                  <a:cs typeface="+mn-cs"/>
-                </a:defRPr>
-              </a:lvl6pPr>
-              <a:lvl7pPr marL="2743200" algn="l" defTabSz="914400" rtl="0" eaLnBrk="1" latinLnBrk="0" hangingPunct="1">
-                <a:defRPr sz="1800" kern="1200">
-                  <a:solidFill>
-                    <a:schemeClr val="tx1"/>
-                  </a:solidFill>
-                  <a:latin typeface="+mn-lt"/>
-                  <a:ea typeface="+mn-ea"/>
-                  <a:cs typeface="+mn-cs"/>
-                </a:defRPr>
-              </a:lvl7pPr>
-              <a:lvl8pPr marL="3200400" algn="l" defTabSz="914400" rtl="0" eaLnBrk="1" latinLnBrk="0" hangingPunct="1">
-                <a:defRPr sz="1800" kern="1200">
-                  <a:solidFill>
-                    <a:schemeClr val="tx1"/>
-                  </a:solidFill>
-                  <a:latin typeface="+mn-lt"/>
-                  <a:ea typeface="+mn-ea"/>
-                  <a:cs typeface="+mn-cs"/>
-                </a:defRPr>
-              </a:lvl8pPr>
-              <a:lvl9pPr marL="3657600" algn="l" defTabSz="914400" rtl="0" eaLnBrk="1" latinLnBrk="0" hangingPunct="1">
-                <a:defRPr sz="1800" kern="1200">
-                  <a:solidFill>
-                    <a:schemeClr val="tx1"/>
-                  </a:solidFill>
-                  <a:latin typeface="+mn-lt"/>
-                  <a:ea typeface="+mn-ea"/>
-                  <a:cs typeface="+mn-cs"/>
-                </a:defRPr>
-              </a:lvl9pPr>
-            </a:lstStyle>
-            <a:p>
-              <a:r>
-                <a:rPr lang="en-US" altLang="zh-CN" sz="1000" dirty="0" smtClean="0">
-                  <a:latin typeface="Times New Roman" panose="02020603050405020304" pitchFamily="18" charset="0"/>
-                  <a:cs typeface="Times New Roman" panose="02020603050405020304" pitchFamily="18" charset="0"/>
-                </a:rPr>
-                <a:t>1</a:t>
-              </a:r>
-              <a:endParaRPr lang="zh-CN" altLang="en-US" sz="1000" dirty="0">
-                <a:latin typeface="Times New Roman" panose="02020603050405020304" pitchFamily="18" charset="0"/>
-                <a:cs typeface="Times New Roman" panose="02020603050405020304" pitchFamily="18" charset="0"/>
-              </a:endParaRPr>
-            </a:p>
-          </p:txBody>
-        </p:sp>
-        <p:cxnSp>
-          <p:nvCxnSpPr>
-            <p:cNvPr id="70" name="曲线连接符 69"/>
-            <p:cNvCxnSpPr>
-              <a:stCxn id="76" idx="2"/>
-              <a:endCxn id="80" idx="0"/>
-            </p:cNvCxnSpPr>
-            <p:nvPr/>
-          </p:nvCxnSpPr>
-          <p:spPr>
-            <a:xfrm rot="16200000" flipH="1">
-              <a:off x="2283311" y="2987519"/>
-              <a:ext cx="684064" cy="643890"/>
-            </a:xfrm>
-            <a:prstGeom prst="curvedConnector3">
-              <a:avLst/>
-            </a:prstGeom>
-            <a:ln>
-              <a:prstDash val="sysDash"/>
-              <a:tailEnd type="triangle"/>
-            </a:ln>
-          </p:spPr>
-          <p:style>
-            <a:lnRef idx="1">
-              <a:schemeClr val="dk1"/>
-            </a:lnRef>
-            <a:fillRef idx="0">
-              <a:schemeClr val="dk1"/>
-            </a:fillRef>
-            <a:effectRef idx="0">
-              <a:schemeClr val="dk1"/>
-            </a:effectRef>
-            <a:fontRef idx="minor">
-              <a:schemeClr val="tx1"/>
-            </a:fontRef>
-          </p:style>
-        </p:cxnSp>
-        <p:cxnSp>
-          <p:nvCxnSpPr>
-            <p:cNvPr id="71" name="曲线连接符 70"/>
-            <p:cNvCxnSpPr>
-              <a:stCxn id="76" idx="2"/>
-              <a:endCxn id="79" idx="0"/>
-            </p:cNvCxnSpPr>
-            <p:nvPr/>
-          </p:nvCxnSpPr>
-          <p:spPr>
-            <a:xfrm rot="5400000">
-              <a:off x="1961366" y="3309464"/>
-              <a:ext cx="684064" cy="12700"/>
-            </a:xfrm>
-            <a:prstGeom prst="curvedConnector3">
-              <a:avLst/>
-            </a:prstGeom>
-            <a:ln>
-              <a:prstDash val="sysDash"/>
-              <a:tailEnd type="triangle"/>
-            </a:ln>
-          </p:spPr>
-          <p:style>
-            <a:lnRef idx="1">
-              <a:schemeClr val="dk1"/>
-            </a:lnRef>
-            <a:fillRef idx="0">
-              <a:schemeClr val="dk1"/>
-            </a:fillRef>
-            <a:effectRef idx="0">
-              <a:schemeClr val="dk1"/>
-            </a:effectRef>
-            <a:fontRef idx="minor">
-              <a:schemeClr val="tx1"/>
-            </a:fontRef>
-          </p:style>
-        </p:cxnSp>
-        <p:sp>
-          <p:nvSpPr>
-            <p:cNvPr id="72" name="文本框 29"/>
-            <p:cNvSpPr txBox="1"/>
-            <p:nvPr/>
-          </p:nvSpPr>
-          <p:spPr>
-            <a:xfrm>
-              <a:off x="1262760" y="3287942"/>
-              <a:ext cx="272670" cy="246221"/>
-            </a:xfrm>
-            <a:prstGeom prst="rect">
-              <a:avLst/>
-            </a:prstGeom>
-            <a:noFill/>
-          </p:spPr>
-          <p:txBody>
-            <a:bodyPr wrap="square" rtlCol="0">
-              <a:spAutoFit/>
-            </a:bodyPr>
-            <a:lstStyle>
-              <a:defPPr>
-                <a:defRPr lang="zh-CN"/>
-              </a:defPPr>
-              <a:lvl1pPr marL="0" algn="l" defTabSz="914400" rtl="0" eaLnBrk="1" latinLnBrk="0" hangingPunct="1">
-                <a:defRPr sz="1800" kern="1200">
-                  <a:solidFill>
-                    <a:schemeClr val="tx1"/>
-                  </a:solidFill>
-                  <a:latin typeface="+mn-lt"/>
-                  <a:ea typeface="+mn-ea"/>
-                  <a:cs typeface="+mn-cs"/>
-                </a:defRPr>
-              </a:lvl1pPr>
-              <a:lvl2pPr marL="457200" algn="l" defTabSz="914400" rtl="0" eaLnBrk="1" latinLnBrk="0" hangingPunct="1">
-                <a:defRPr sz="1800" kern="1200">
-                  <a:solidFill>
-                    <a:schemeClr val="tx1"/>
-                  </a:solidFill>
-                  <a:latin typeface="+mn-lt"/>
-                  <a:ea typeface="+mn-ea"/>
-                  <a:cs typeface="+mn-cs"/>
-                </a:defRPr>
-              </a:lvl2pPr>
-              <a:lvl3pPr marL="914400" algn="l" defTabSz="914400" rtl="0" eaLnBrk="1" latinLnBrk="0" hangingPunct="1">
-                <a:defRPr sz="1800" kern="1200">
-                  <a:solidFill>
-                    <a:schemeClr val="tx1"/>
-                  </a:solidFill>
-                  <a:latin typeface="+mn-lt"/>
-                  <a:ea typeface="+mn-ea"/>
-                  <a:cs typeface="+mn-cs"/>
-                </a:defRPr>
-              </a:lvl3pPr>
-              <a:lvl4pPr marL="1371600" algn="l" defTabSz="914400" rtl="0" eaLnBrk="1" latinLnBrk="0" hangingPunct="1">
-                <a:defRPr sz="1800" kern="1200">
-                  <a:solidFill>
-                    <a:schemeClr val="tx1"/>
-                  </a:solidFill>
-                  <a:latin typeface="+mn-lt"/>
-                  <a:ea typeface="+mn-ea"/>
-                  <a:cs typeface="+mn-cs"/>
-                </a:defRPr>
-              </a:lvl4pPr>
-              <a:lvl5pPr marL="1828800" algn="l" defTabSz="914400" rtl="0" eaLnBrk="1" latinLnBrk="0" hangingPunct="1">
-                <a:defRPr sz="1800" kern="1200">
-                  <a:solidFill>
-                    <a:schemeClr val="tx1"/>
-                  </a:solidFill>
-                  <a:latin typeface="+mn-lt"/>
-                  <a:ea typeface="+mn-ea"/>
-                  <a:cs typeface="+mn-cs"/>
-                </a:defRPr>
-              </a:lvl5pPr>
-              <a:lvl6pPr marL="2286000" algn="l" defTabSz="914400" rtl="0" eaLnBrk="1" latinLnBrk="0" hangingPunct="1">
-                <a:defRPr sz="1800" kern="1200">
-                  <a:solidFill>
-                    <a:schemeClr val="tx1"/>
-                  </a:solidFill>
-                  <a:latin typeface="+mn-lt"/>
-                  <a:ea typeface="+mn-ea"/>
-                  <a:cs typeface="+mn-cs"/>
-                </a:defRPr>
-              </a:lvl6pPr>
-              <a:lvl7pPr marL="2743200" algn="l" defTabSz="914400" rtl="0" eaLnBrk="1" latinLnBrk="0" hangingPunct="1">
-                <a:defRPr sz="1800" kern="1200">
-                  <a:solidFill>
-                    <a:schemeClr val="tx1"/>
-                  </a:solidFill>
-                  <a:latin typeface="+mn-lt"/>
-                  <a:ea typeface="+mn-ea"/>
-                  <a:cs typeface="+mn-cs"/>
-                </a:defRPr>
-              </a:lvl7pPr>
-              <a:lvl8pPr marL="3200400" algn="l" defTabSz="914400" rtl="0" eaLnBrk="1" latinLnBrk="0" hangingPunct="1">
-                <a:defRPr sz="1800" kern="1200">
-                  <a:solidFill>
-                    <a:schemeClr val="tx1"/>
-                  </a:solidFill>
-                  <a:latin typeface="+mn-lt"/>
-                  <a:ea typeface="+mn-ea"/>
-                  <a:cs typeface="+mn-cs"/>
-                </a:defRPr>
-              </a:lvl8pPr>
-              <a:lvl9pPr marL="3657600" algn="l" defTabSz="914400" rtl="0" eaLnBrk="1" latinLnBrk="0" hangingPunct="1">
-                <a:defRPr sz="1800" kern="1200">
-                  <a:solidFill>
-                    <a:schemeClr val="tx1"/>
-                  </a:solidFill>
-                  <a:latin typeface="+mn-lt"/>
-                  <a:ea typeface="+mn-ea"/>
-                  <a:cs typeface="+mn-cs"/>
-                </a:defRPr>
-              </a:lvl9pPr>
-            </a:lstStyle>
-            <a:p>
-              <a:r>
-                <a:rPr lang="en-US" altLang="zh-CN" sz="1000" dirty="0" smtClean="0">
-                  <a:latin typeface="Times New Roman" panose="02020603050405020304" pitchFamily="18" charset="0"/>
-                  <a:cs typeface="Times New Roman" panose="02020603050405020304" pitchFamily="18" charset="0"/>
-                </a:rPr>
-                <a:t>2</a:t>
-              </a:r>
-              <a:endParaRPr lang="zh-CN" altLang="en-US" sz="1000" dirty="0">
-                <a:latin typeface="Times New Roman" panose="02020603050405020304" pitchFamily="18" charset="0"/>
-                <a:cs typeface="Times New Roman" panose="02020603050405020304" pitchFamily="18" charset="0"/>
-              </a:endParaRPr>
-            </a:p>
-          </p:txBody>
-        </p:sp>
-        <p:cxnSp>
-          <p:nvCxnSpPr>
-            <p:cNvPr id="73" name="直接箭头连接符 72"/>
-            <p:cNvCxnSpPr>
-              <a:stCxn id="68" idx="6"/>
-              <a:endCxn id="79" idx="1"/>
-            </p:cNvCxnSpPr>
-            <p:nvPr/>
-          </p:nvCxnSpPr>
-          <p:spPr>
-            <a:xfrm>
-              <a:off x="1117982" y="3050595"/>
-              <a:ext cx="880616" cy="720916"/>
-            </a:xfrm>
-            <a:prstGeom prst="straightConnector1">
-              <a:avLst/>
-            </a:prstGeom>
-            <a:ln>
-              <a:tailEnd type="triangle"/>
-            </a:ln>
-          </p:spPr>
-          <p:style>
-            <a:lnRef idx="1">
-              <a:schemeClr val="dk1"/>
-            </a:lnRef>
-            <a:fillRef idx="0">
-              <a:schemeClr val="dk1"/>
-            </a:fillRef>
-            <a:effectRef idx="0">
-              <a:schemeClr val="dk1"/>
-            </a:effectRef>
-            <a:fontRef idx="minor">
-              <a:schemeClr val="tx1"/>
-            </a:fontRef>
-          </p:style>
-        </p:cxnSp>
-        <p:cxnSp>
-          <p:nvCxnSpPr>
-            <p:cNvPr id="74" name="直接箭头连接符 73"/>
-            <p:cNvCxnSpPr>
-              <a:stCxn id="82" idx="2"/>
-              <a:endCxn id="76" idx="0"/>
-            </p:cNvCxnSpPr>
-            <p:nvPr/>
-          </p:nvCxnSpPr>
-          <p:spPr>
-            <a:xfrm flipH="1">
-              <a:off x="2303398" y="2093037"/>
-              <a:ext cx="133541" cy="634365"/>
-            </a:xfrm>
-            <a:prstGeom prst="straightConnector1">
-              <a:avLst/>
-            </a:prstGeom>
-            <a:ln>
-              <a:tailEnd type="triangle"/>
-            </a:ln>
-          </p:spPr>
-          <p:style>
-            <a:lnRef idx="1">
-              <a:schemeClr val="dk1"/>
-            </a:lnRef>
-            <a:fillRef idx="0">
-              <a:schemeClr val="dk1"/>
-            </a:fillRef>
-            <a:effectRef idx="0">
-              <a:schemeClr val="dk1"/>
-            </a:effectRef>
-            <a:fontRef idx="minor">
-              <a:schemeClr val="tx1"/>
-            </a:fontRef>
-          </p:style>
-        </p:cxnSp>
-      </p:grpSp>
-      <p:grpSp>
-        <p:nvGrpSpPr>
           <p:cNvPr id="83" name="组合 82"/>
           <p:cNvGrpSpPr/>
           <p:nvPr/>
@@ -9214,6 +7297,2087 @@
           </a:fontRef>
         </p:style>
       </p:cxnSp>
+      <p:grpSp>
+        <p:nvGrpSpPr>
+          <p:cNvPr id="4" name="组合 3"/>
+          <p:cNvGrpSpPr/>
+          <p:nvPr/>
+        </p:nvGrpSpPr>
+        <p:grpSpPr>
+          <a:xfrm>
+            <a:off x="4720964" y="437055"/>
+            <a:ext cx="2985388" cy="2410304"/>
+            <a:chOff x="4720964" y="437055"/>
+            <a:chExt cx="2985388" cy="2410304"/>
+          </a:xfrm>
+        </p:grpSpPr>
+        <p:grpSp>
+          <p:nvGrpSpPr>
+            <p:cNvPr id="63" name="组合 62"/>
+            <p:cNvGrpSpPr/>
+            <p:nvPr/>
+          </p:nvGrpSpPr>
+          <p:grpSpPr>
+            <a:xfrm>
+              <a:off x="6338753" y="456415"/>
+              <a:ext cx="906780" cy="586740"/>
+              <a:chOff x="2034540" y="1504950"/>
+              <a:chExt cx="906780" cy="586740"/>
+            </a:xfrm>
+          </p:grpSpPr>
+          <p:sp>
+            <p:nvSpPr>
+              <p:cNvPr id="81" name="圆角矩形 80"/>
+              <p:cNvSpPr/>
+              <p:nvPr/>
+            </p:nvSpPr>
+            <p:spPr>
+              <a:xfrm>
+                <a:off x="2034540" y="1504950"/>
+                <a:ext cx="906780" cy="586740"/>
+              </a:xfrm>
+              <a:prstGeom prst="roundRect">
+                <a:avLst/>
+              </a:prstGeom>
+            </p:spPr>
+            <p:style>
+              <a:lnRef idx="2">
+                <a:schemeClr val="dk1"/>
+              </a:lnRef>
+              <a:fillRef idx="1">
+                <a:schemeClr val="lt1"/>
+              </a:fillRef>
+              <a:effectRef idx="0">
+                <a:schemeClr val="dk1"/>
+              </a:effectRef>
+              <a:fontRef idx="minor">
+                <a:schemeClr val="dk1"/>
+              </a:fontRef>
+            </p:style>
+            <p:txBody>
+              <a:bodyPr rot="0" spcFirstLastPara="0" vert="horz" wrap="square" lIns="91440" tIns="45720" rIns="91440" bIns="45720" numCol="1" spcCol="0" rtlCol="0" fromWordArt="0" anchor="t" anchorCtr="0" forceAA="0" compatLnSpc="1">
+                <a:prstTxWarp prst="textNoShape">
+                  <a:avLst/>
+                </a:prstTxWarp>
+                <a:noAutofit/>
+              </a:bodyPr>
+              <a:lstStyle>
+                <a:defPPr>
+                  <a:defRPr lang="zh-CN"/>
+                </a:defPPr>
+                <a:lvl1pPr marL="0" algn="l" defTabSz="914400" rtl="0" eaLnBrk="1" latinLnBrk="0" hangingPunct="1">
+                  <a:defRPr sz="1800" kern="1200">
+                    <a:solidFill>
+                      <a:schemeClr val="dk1"/>
+                    </a:solidFill>
+                    <a:latin typeface="+mn-lt"/>
+                    <a:ea typeface="+mn-ea"/>
+                    <a:cs typeface="+mn-cs"/>
+                  </a:defRPr>
+                </a:lvl1pPr>
+                <a:lvl2pPr marL="457200" algn="l" defTabSz="914400" rtl="0" eaLnBrk="1" latinLnBrk="0" hangingPunct="1">
+                  <a:defRPr sz="1800" kern="1200">
+                    <a:solidFill>
+                      <a:schemeClr val="dk1"/>
+                    </a:solidFill>
+                    <a:latin typeface="+mn-lt"/>
+                    <a:ea typeface="+mn-ea"/>
+                    <a:cs typeface="+mn-cs"/>
+                  </a:defRPr>
+                </a:lvl2pPr>
+                <a:lvl3pPr marL="914400" algn="l" defTabSz="914400" rtl="0" eaLnBrk="1" latinLnBrk="0" hangingPunct="1">
+                  <a:defRPr sz="1800" kern="1200">
+                    <a:solidFill>
+                      <a:schemeClr val="dk1"/>
+                    </a:solidFill>
+                    <a:latin typeface="+mn-lt"/>
+                    <a:ea typeface="+mn-ea"/>
+                    <a:cs typeface="+mn-cs"/>
+                  </a:defRPr>
+                </a:lvl3pPr>
+                <a:lvl4pPr marL="1371600" algn="l" defTabSz="914400" rtl="0" eaLnBrk="1" latinLnBrk="0" hangingPunct="1">
+                  <a:defRPr sz="1800" kern="1200">
+                    <a:solidFill>
+                      <a:schemeClr val="dk1"/>
+                    </a:solidFill>
+                    <a:latin typeface="+mn-lt"/>
+                    <a:ea typeface="+mn-ea"/>
+                    <a:cs typeface="+mn-cs"/>
+                  </a:defRPr>
+                </a:lvl4pPr>
+                <a:lvl5pPr marL="1828800" algn="l" defTabSz="914400" rtl="0" eaLnBrk="1" latinLnBrk="0" hangingPunct="1">
+                  <a:defRPr sz="1800" kern="1200">
+                    <a:solidFill>
+                      <a:schemeClr val="dk1"/>
+                    </a:solidFill>
+                    <a:latin typeface="+mn-lt"/>
+                    <a:ea typeface="+mn-ea"/>
+                    <a:cs typeface="+mn-cs"/>
+                  </a:defRPr>
+                </a:lvl5pPr>
+                <a:lvl6pPr marL="2286000" algn="l" defTabSz="914400" rtl="0" eaLnBrk="1" latinLnBrk="0" hangingPunct="1">
+                  <a:defRPr sz="1800" kern="1200">
+                    <a:solidFill>
+                      <a:schemeClr val="dk1"/>
+                    </a:solidFill>
+                    <a:latin typeface="+mn-lt"/>
+                    <a:ea typeface="+mn-ea"/>
+                    <a:cs typeface="+mn-cs"/>
+                  </a:defRPr>
+                </a:lvl6pPr>
+                <a:lvl7pPr marL="2743200" algn="l" defTabSz="914400" rtl="0" eaLnBrk="1" latinLnBrk="0" hangingPunct="1">
+                  <a:defRPr sz="1800" kern="1200">
+                    <a:solidFill>
+                      <a:schemeClr val="dk1"/>
+                    </a:solidFill>
+                    <a:latin typeface="+mn-lt"/>
+                    <a:ea typeface="+mn-ea"/>
+                    <a:cs typeface="+mn-cs"/>
+                  </a:defRPr>
+                </a:lvl7pPr>
+                <a:lvl8pPr marL="3200400" algn="l" defTabSz="914400" rtl="0" eaLnBrk="1" latinLnBrk="0" hangingPunct="1">
+                  <a:defRPr sz="1800" kern="1200">
+                    <a:solidFill>
+                      <a:schemeClr val="dk1"/>
+                    </a:solidFill>
+                    <a:latin typeface="+mn-lt"/>
+                    <a:ea typeface="+mn-ea"/>
+                    <a:cs typeface="+mn-cs"/>
+                  </a:defRPr>
+                </a:lvl8pPr>
+                <a:lvl9pPr marL="3657600" algn="l" defTabSz="914400" rtl="0" eaLnBrk="1" latinLnBrk="0" hangingPunct="1">
+                  <a:defRPr sz="1800" kern="1200">
+                    <a:solidFill>
+                      <a:schemeClr val="dk1"/>
+                    </a:solidFill>
+                    <a:latin typeface="+mn-lt"/>
+                    <a:ea typeface="+mn-ea"/>
+                    <a:cs typeface="+mn-cs"/>
+                  </a:defRPr>
+                </a:lvl9pPr>
+              </a:lstStyle>
+              <a:p>
+                <a:pPr algn="ctr"/>
+                <a:r>
+                  <a:rPr lang="en-US" altLang="zh-CN" sz="1200" dirty="0" smtClean="0"/>
+                  <a:t>RM</a:t>
+                </a:r>
+              </a:p>
+            </p:txBody>
+          </p:sp>
+          <p:sp>
+            <p:nvSpPr>
+              <p:cNvPr id="82" name="矩形 81"/>
+              <p:cNvSpPr/>
+              <p:nvPr/>
+            </p:nvSpPr>
+            <p:spPr>
+              <a:xfrm>
+                <a:off x="2202180" y="1798320"/>
+                <a:ext cx="609600" cy="240030"/>
+              </a:xfrm>
+              <a:prstGeom prst="rect">
+                <a:avLst/>
+              </a:prstGeom>
+            </p:spPr>
+            <p:style>
+              <a:lnRef idx="2">
+                <a:schemeClr val="dk1"/>
+              </a:lnRef>
+              <a:fillRef idx="1">
+                <a:schemeClr val="lt1"/>
+              </a:fillRef>
+              <a:effectRef idx="0">
+                <a:schemeClr val="dk1"/>
+              </a:effectRef>
+              <a:fontRef idx="minor">
+                <a:schemeClr val="dk1"/>
+              </a:fontRef>
+            </p:style>
+            <p:txBody>
+              <a:bodyPr rot="0" spcFirstLastPara="0" vert="horz" wrap="square" lIns="91440" tIns="45720" rIns="91440" bIns="45720" numCol="1" spcCol="0" rtlCol="0" fromWordArt="0" anchor="ctr" anchorCtr="0" forceAA="0" compatLnSpc="1">
+                <a:prstTxWarp prst="textNoShape">
+                  <a:avLst/>
+                </a:prstTxWarp>
+                <a:noAutofit/>
+              </a:bodyPr>
+              <a:lstStyle>
+                <a:defPPr>
+                  <a:defRPr lang="zh-CN"/>
+                </a:defPPr>
+                <a:lvl1pPr marL="0" algn="l" defTabSz="914400" rtl="0" eaLnBrk="1" latinLnBrk="0" hangingPunct="1">
+                  <a:defRPr sz="1800" kern="1200">
+                    <a:solidFill>
+                      <a:schemeClr val="dk1"/>
+                    </a:solidFill>
+                    <a:latin typeface="+mn-lt"/>
+                    <a:ea typeface="+mn-ea"/>
+                    <a:cs typeface="+mn-cs"/>
+                  </a:defRPr>
+                </a:lvl1pPr>
+                <a:lvl2pPr marL="457200" algn="l" defTabSz="914400" rtl="0" eaLnBrk="1" latinLnBrk="0" hangingPunct="1">
+                  <a:defRPr sz="1800" kern="1200">
+                    <a:solidFill>
+                      <a:schemeClr val="dk1"/>
+                    </a:solidFill>
+                    <a:latin typeface="+mn-lt"/>
+                    <a:ea typeface="+mn-ea"/>
+                    <a:cs typeface="+mn-cs"/>
+                  </a:defRPr>
+                </a:lvl2pPr>
+                <a:lvl3pPr marL="914400" algn="l" defTabSz="914400" rtl="0" eaLnBrk="1" latinLnBrk="0" hangingPunct="1">
+                  <a:defRPr sz="1800" kern="1200">
+                    <a:solidFill>
+                      <a:schemeClr val="dk1"/>
+                    </a:solidFill>
+                    <a:latin typeface="+mn-lt"/>
+                    <a:ea typeface="+mn-ea"/>
+                    <a:cs typeface="+mn-cs"/>
+                  </a:defRPr>
+                </a:lvl3pPr>
+                <a:lvl4pPr marL="1371600" algn="l" defTabSz="914400" rtl="0" eaLnBrk="1" latinLnBrk="0" hangingPunct="1">
+                  <a:defRPr sz="1800" kern="1200">
+                    <a:solidFill>
+                      <a:schemeClr val="dk1"/>
+                    </a:solidFill>
+                    <a:latin typeface="+mn-lt"/>
+                    <a:ea typeface="+mn-ea"/>
+                    <a:cs typeface="+mn-cs"/>
+                  </a:defRPr>
+                </a:lvl4pPr>
+                <a:lvl5pPr marL="1828800" algn="l" defTabSz="914400" rtl="0" eaLnBrk="1" latinLnBrk="0" hangingPunct="1">
+                  <a:defRPr sz="1800" kern="1200">
+                    <a:solidFill>
+                      <a:schemeClr val="dk1"/>
+                    </a:solidFill>
+                    <a:latin typeface="+mn-lt"/>
+                    <a:ea typeface="+mn-ea"/>
+                    <a:cs typeface="+mn-cs"/>
+                  </a:defRPr>
+                </a:lvl5pPr>
+                <a:lvl6pPr marL="2286000" algn="l" defTabSz="914400" rtl="0" eaLnBrk="1" latinLnBrk="0" hangingPunct="1">
+                  <a:defRPr sz="1800" kern="1200">
+                    <a:solidFill>
+                      <a:schemeClr val="dk1"/>
+                    </a:solidFill>
+                    <a:latin typeface="+mn-lt"/>
+                    <a:ea typeface="+mn-ea"/>
+                    <a:cs typeface="+mn-cs"/>
+                  </a:defRPr>
+                </a:lvl6pPr>
+                <a:lvl7pPr marL="2743200" algn="l" defTabSz="914400" rtl="0" eaLnBrk="1" latinLnBrk="0" hangingPunct="1">
+                  <a:defRPr sz="1800" kern="1200">
+                    <a:solidFill>
+                      <a:schemeClr val="dk1"/>
+                    </a:solidFill>
+                    <a:latin typeface="+mn-lt"/>
+                    <a:ea typeface="+mn-ea"/>
+                    <a:cs typeface="+mn-cs"/>
+                  </a:defRPr>
+                </a:lvl7pPr>
+                <a:lvl8pPr marL="3200400" algn="l" defTabSz="914400" rtl="0" eaLnBrk="1" latinLnBrk="0" hangingPunct="1">
+                  <a:defRPr sz="1800" kern="1200">
+                    <a:solidFill>
+                      <a:schemeClr val="dk1"/>
+                    </a:solidFill>
+                    <a:latin typeface="+mn-lt"/>
+                    <a:ea typeface="+mn-ea"/>
+                    <a:cs typeface="+mn-cs"/>
+                  </a:defRPr>
+                </a:lvl8pPr>
+                <a:lvl9pPr marL="3657600" algn="l" defTabSz="914400" rtl="0" eaLnBrk="1" latinLnBrk="0" hangingPunct="1">
+                  <a:defRPr sz="1800" kern="1200">
+                    <a:solidFill>
+                      <a:schemeClr val="dk1"/>
+                    </a:solidFill>
+                    <a:latin typeface="+mn-lt"/>
+                    <a:ea typeface="+mn-ea"/>
+                    <a:cs typeface="+mn-cs"/>
+                  </a:defRPr>
+                </a:lvl9pPr>
+              </a:lstStyle>
+              <a:p>
+                <a:pPr algn="ctr"/>
+                <a:r>
+                  <a:rPr lang="en-US" altLang="zh-CN" sz="800" dirty="0" smtClean="0"/>
+                  <a:t>Resource Scheduler</a:t>
+                </a:r>
+                <a:endParaRPr lang="zh-CN" altLang="en-US" sz="800" dirty="0"/>
+              </a:p>
+            </p:txBody>
+          </p:sp>
+        </p:grpSp>
+        <p:grpSp>
+          <p:nvGrpSpPr>
+            <p:cNvPr id="64" name="组合 63"/>
+            <p:cNvGrpSpPr/>
+            <p:nvPr/>
+          </p:nvGrpSpPr>
+          <p:grpSpPr>
+            <a:xfrm>
+              <a:off x="6327132" y="2260619"/>
+              <a:ext cx="1379220" cy="586740"/>
+              <a:chOff x="3749040" y="1211580"/>
+              <a:chExt cx="1379220" cy="586740"/>
+            </a:xfrm>
+          </p:grpSpPr>
+          <p:sp>
+            <p:nvSpPr>
+              <p:cNvPr id="78" name="圆角矩形 77"/>
+              <p:cNvSpPr/>
+              <p:nvPr/>
+            </p:nvSpPr>
+            <p:spPr>
+              <a:xfrm>
+                <a:off x="3749040" y="1211580"/>
+                <a:ext cx="1379220" cy="586740"/>
+              </a:xfrm>
+              <a:prstGeom prst="roundRect">
+                <a:avLst/>
+              </a:prstGeom>
+            </p:spPr>
+            <p:style>
+              <a:lnRef idx="2">
+                <a:schemeClr val="dk1"/>
+              </a:lnRef>
+              <a:fillRef idx="1">
+                <a:schemeClr val="lt1"/>
+              </a:fillRef>
+              <a:effectRef idx="0">
+                <a:schemeClr val="dk1"/>
+              </a:effectRef>
+              <a:fontRef idx="minor">
+                <a:schemeClr val="dk1"/>
+              </a:fontRef>
+            </p:style>
+            <p:txBody>
+              <a:bodyPr rot="0" spcFirstLastPara="0" vert="horz" wrap="square" lIns="91440" tIns="45720" rIns="91440" bIns="45720" numCol="1" spcCol="0" rtlCol="0" fromWordArt="0" anchor="t" anchorCtr="0" forceAA="0" compatLnSpc="1">
+                <a:prstTxWarp prst="textNoShape">
+                  <a:avLst/>
+                </a:prstTxWarp>
+                <a:noAutofit/>
+              </a:bodyPr>
+              <a:lstStyle>
+                <a:defPPr>
+                  <a:defRPr lang="zh-CN"/>
+                </a:defPPr>
+                <a:lvl1pPr marL="0" algn="l" defTabSz="914400" rtl="0" eaLnBrk="1" latinLnBrk="0" hangingPunct="1">
+                  <a:defRPr sz="1800" kern="1200">
+                    <a:solidFill>
+                      <a:schemeClr val="dk1"/>
+                    </a:solidFill>
+                    <a:latin typeface="+mn-lt"/>
+                    <a:ea typeface="+mn-ea"/>
+                    <a:cs typeface="+mn-cs"/>
+                  </a:defRPr>
+                </a:lvl1pPr>
+                <a:lvl2pPr marL="457200" algn="l" defTabSz="914400" rtl="0" eaLnBrk="1" latinLnBrk="0" hangingPunct="1">
+                  <a:defRPr sz="1800" kern="1200">
+                    <a:solidFill>
+                      <a:schemeClr val="dk1"/>
+                    </a:solidFill>
+                    <a:latin typeface="+mn-lt"/>
+                    <a:ea typeface="+mn-ea"/>
+                    <a:cs typeface="+mn-cs"/>
+                  </a:defRPr>
+                </a:lvl2pPr>
+                <a:lvl3pPr marL="914400" algn="l" defTabSz="914400" rtl="0" eaLnBrk="1" latinLnBrk="0" hangingPunct="1">
+                  <a:defRPr sz="1800" kern="1200">
+                    <a:solidFill>
+                      <a:schemeClr val="dk1"/>
+                    </a:solidFill>
+                    <a:latin typeface="+mn-lt"/>
+                    <a:ea typeface="+mn-ea"/>
+                    <a:cs typeface="+mn-cs"/>
+                  </a:defRPr>
+                </a:lvl3pPr>
+                <a:lvl4pPr marL="1371600" algn="l" defTabSz="914400" rtl="0" eaLnBrk="1" latinLnBrk="0" hangingPunct="1">
+                  <a:defRPr sz="1800" kern="1200">
+                    <a:solidFill>
+                      <a:schemeClr val="dk1"/>
+                    </a:solidFill>
+                    <a:latin typeface="+mn-lt"/>
+                    <a:ea typeface="+mn-ea"/>
+                    <a:cs typeface="+mn-cs"/>
+                  </a:defRPr>
+                </a:lvl4pPr>
+                <a:lvl5pPr marL="1828800" algn="l" defTabSz="914400" rtl="0" eaLnBrk="1" latinLnBrk="0" hangingPunct="1">
+                  <a:defRPr sz="1800" kern="1200">
+                    <a:solidFill>
+                      <a:schemeClr val="dk1"/>
+                    </a:solidFill>
+                    <a:latin typeface="+mn-lt"/>
+                    <a:ea typeface="+mn-ea"/>
+                    <a:cs typeface="+mn-cs"/>
+                  </a:defRPr>
+                </a:lvl5pPr>
+                <a:lvl6pPr marL="2286000" algn="l" defTabSz="914400" rtl="0" eaLnBrk="1" latinLnBrk="0" hangingPunct="1">
+                  <a:defRPr sz="1800" kern="1200">
+                    <a:solidFill>
+                      <a:schemeClr val="dk1"/>
+                    </a:solidFill>
+                    <a:latin typeface="+mn-lt"/>
+                    <a:ea typeface="+mn-ea"/>
+                    <a:cs typeface="+mn-cs"/>
+                  </a:defRPr>
+                </a:lvl6pPr>
+                <a:lvl7pPr marL="2743200" algn="l" defTabSz="914400" rtl="0" eaLnBrk="1" latinLnBrk="0" hangingPunct="1">
+                  <a:defRPr sz="1800" kern="1200">
+                    <a:solidFill>
+                      <a:schemeClr val="dk1"/>
+                    </a:solidFill>
+                    <a:latin typeface="+mn-lt"/>
+                    <a:ea typeface="+mn-ea"/>
+                    <a:cs typeface="+mn-cs"/>
+                  </a:defRPr>
+                </a:lvl7pPr>
+                <a:lvl8pPr marL="3200400" algn="l" defTabSz="914400" rtl="0" eaLnBrk="1" latinLnBrk="0" hangingPunct="1">
+                  <a:defRPr sz="1800" kern="1200">
+                    <a:solidFill>
+                      <a:schemeClr val="dk1"/>
+                    </a:solidFill>
+                    <a:latin typeface="+mn-lt"/>
+                    <a:ea typeface="+mn-ea"/>
+                    <a:cs typeface="+mn-cs"/>
+                  </a:defRPr>
+                </a:lvl8pPr>
+                <a:lvl9pPr marL="3657600" algn="l" defTabSz="914400" rtl="0" eaLnBrk="1" latinLnBrk="0" hangingPunct="1">
+                  <a:defRPr sz="1800" kern="1200">
+                    <a:solidFill>
+                      <a:schemeClr val="dk1"/>
+                    </a:solidFill>
+                    <a:latin typeface="+mn-lt"/>
+                    <a:ea typeface="+mn-ea"/>
+                    <a:cs typeface="+mn-cs"/>
+                  </a:defRPr>
+                </a:lvl9pPr>
+              </a:lstStyle>
+              <a:p>
+                <a:pPr algn="ctr"/>
+                <a:r>
+                  <a:rPr lang="en-US" altLang="zh-CN" sz="1200" dirty="0" smtClean="0"/>
+                  <a:t>NM</a:t>
+                </a:r>
+              </a:p>
+            </p:txBody>
+          </p:sp>
+          <p:sp>
+            <p:nvSpPr>
+              <p:cNvPr id="79" name="矩形 78"/>
+              <p:cNvSpPr/>
+              <p:nvPr/>
+            </p:nvSpPr>
+            <p:spPr>
+              <a:xfrm>
+                <a:off x="3794760" y="1499235"/>
+                <a:ext cx="609600" cy="240030"/>
+              </a:xfrm>
+              <a:prstGeom prst="rect">
+                <a:avLst/>
+              </a:prstGeom>
+            </p:spPr>
+            <p:style>
+              <a:lnRef idx="2">
+                <a:schemeClr val="dk1"/>
+              </a:lnRef>
+              <a:fillRef idx="1">
+                <a:schemeClr val="lt1"/>
+              </a:fillRef>
+              <a:effectRef idx="0">
+                <a:schemeClr val="dk1"/>
+              </a:effectRef>
+              <a:fontRef idx="minor">
+                <a:schemeClr val="dk1"/>
+              </a:fontRef>
+            </p:style>
+            <p:txBody>
+              <a:bodyPr rot="0" spcFirstLastPara="0" vert="horz" wrap="square" lIns="91440" tIns="45720" rIns="91440" bIns="45720" numCol="1" spcCol="0" rtlCol="0" fromWordArt="0" anchor="ctr" anchorCtr="0" forceAA="0" compatLnSpc="1">
+                <a:prstTxWarp prst="textNoShape">
+                  <a:avLst/>
+                </a:prstTxWarp>
+                <a:noAutofit/>
+              </a:bodyPr>
+              <a:lstStyle>
+                <a:defPPr>
+                  <a:defRPr lang="zh-CN"/>
+                </a:defPPr>
+                <a:lvl1pPr marL="0" algn="l" defTabSz="914400" rtl="0" eaLnBrk="1" latinLnBrk="0" hangingPunct="1">
+                  <a:defRPr sz="1800" kern="1200">
+                    <a:solidFill>
+                      <a:schemeClr val="dk1"/>
+                    </a:solidFill>
+                    <a:latin typeface="+mn-lt"/>
+                    <a:ea typeface="+mn-ea"/>
+                    <a:cs typeface="+mn-cs"/>
+                  </a:defRPr>
+                </a:lvl1pPr>
+                <a:lvl2pPr marL="457200" algn="l" defTabSz="914400" rtl="0" eaLnBrk="1" latinLnBrk="0" hangingPunct="1">
+                  <a:defRPr sz="1800" kern="1200">
+                    <a:solidFill>
+                      <a:schemeClr val="dk1"/>
+                    </a:solidFill>
+                    <a:latin typeface="+mn-lt"/>
+                    <a:ea typeface="+mn-ea"/>
+                    <a:cs typeface="+mn-cs"/>
+                  </a:defRPr>
+                </a:lvl2pPr>
+                <a:lvl3pPr marL="914400" algn="l" defTabSz="914400" rtl="0" eaLnBrk="1" latinLnBrk="0" hangingPunct="1">
+                  <a:defRPr sz="1800" kern="1200">
+                    <a:solidFill>
+                      <a:schemeClr val="dk1"/>
+                    </a:solidFill>
+                    <a:latin typeface="+mn-lt"/>
+                    <a:ea typeface="+mn-ea"/>
+                    <a:cs typeface="+mn-cs"/>
+                  </a:defRPr>
+                </a:lvl3pPr>
+                <a:lvl4pPr marL="1371600" algn="l" defTabSz="914400" rtl="0" eaLnBrk="1" latinLnBrk="0" hangingPunct="1">
+                  <a:defRPr sz="1800" kern="1200">
+                    <a:solidFill>
+                      <a:schemeClr val="dk1"/>
+                    </a:solidFill>
+                    <a:latin typeface="+mn-lt"/>
+                    <a:ea typeface="+mn-ea"/>
+                    <a:cs typeface="+mn-cs"/>
+                  </a:defRPr>
+                </a:lvl4pPr>
+                <a:lvl5pPr marL="1828800" algn="l" defTabSz="914400" rtl="0" eaLnBrk="1" latinLnBrk="0" hangingPunct="1">
+                  <a:defRPr sz="1800" kern="1200">
+                    <a:solidFill>
+                      <a:schemeClr val="dk1"/>
+                    </a:solidFill>
+                    <a:latin typeface="+mn-lt"/>
+                    <a:ea typeface="+mn-ea"/>
+                    <a:cs typeface="+mn-cs"/>
+                  </a:defRPr>
+                </a:lvl5pPr>
+                <a:lvl6pPr marL="2286000" algn="l" defTabSz="914400" rtl="0" eaLnBrk="1" latinLnBrk="0" hangingPunct="1">
+                  <a:defRPr sz="1800" kern="1200">
+                    <a:solidFill>
+                      <a:schemeClr val="dk1"/>
+                    </a:solidFill>
+                    <a:latin typeface="+mn-lt"/>
+                    <a:ea typeface="+mn-ea"/>
+                    <a:cs typeface="+mn-cs"/>
+                  </a:defRPr>
+                </a:lvl6pPr>
+                <a:lvl7pPr marL="2743200" algn="l" defTabSz="914400" rtl="0" eaLnBrk="1" latinLnBrk="0" hangingPunct="1">
+                  <a:defRPr sz="1800" kern="1200">
+                    <a:solidFill>
+                      <a:schemeClr val="dk1"/>
+                    </a:solidFill>
+                    <a:latin typeface="+mn-lt"/>
+                    <a:ea typeface="+mn-ea"/>
+                    <a:cs typeface="+mn-cs"/>
+                  </a:defRPr>
+                </a:lvl7pPr>
+                <a:lvl8pPr marL="3200400" algn="l" defTabSz="914400" rtl="0" eaLnBrk="1" latinLnBrk="0" hangingPunct="1">
+                  <a:defRPr sz="1800" kern="1200">
+                    <a:solidFill>
+                      <a:schemeClr val="dk1"/>
+                    </a:solidFill>
+                    <a:latin typeface="+mn-lt"/>
+                    <a:ea typeface="+mn-ea"/>
+                    <a:cs typeface="+mn-cs"/>
+                  </a:defRPr>
+                </a:lvl8pPr>
+                <a:lvl9pPr marL="3657600" algn="l" defTabSz="914400" rtl="0" eaLnBrk="1" latinLnBrk="0" hangingPunct="1">
+                  <a:defRPr sz="1800" kern="1200">
+                    <a:solidFill>
+                      <a:schemeClr val="dk1"/>
+                    </a:solidFill>
+                    <a:latin typeface="+mn-lt"/>
+                    <a:ea typeface="+mn-ea"/>
+                    <a:cs typeface="+mn-cs"/>
+                  </a:defRPr>
+                </a:lvl9pPr>
+              </a:lstStyle>
+              <a:p>
+                <a:pPr algn="ctr"/>
+                <a:r>
+                  <a:rPr lang="en-US" altLang="zh-CN" sz="800" dirty="0" smtClean="0"/>
+                  <a:t>Container</a:t>
+                </a:r>
+                <a:endParaRPr lang="zh-CN" altLang="en-US" sz="800" dirty="0"/>
+              </a:p>
+            </p:txBody>
+          </p:sp>
+          <p:sp>
+            <p:nvSpPr>
+              <p:cNvPr id="80" name="矩形 79"/>
+              <p:cNvSpPr/>
+              <p:nvPr/>
+            </p:nvSpPr>
+            <p:spPr>
+              <a:xfrm>
+                <a:off x="4438650" y="1499235"/>
+                <a:ext cx="609600" cy="240030"/>
+              </a:xfrm>
+              <a:prstGeom prst="rect">
+                <a:avLst/>
+              </a:prstGeom>
+            </p:spPr>
+            <p:style>
+              <a:lnRef idx="2">
+                <a:schemeClr val="dk1"/>
+              </a:lnRef>
+              <a:fillRef idx="1">
+                <a:schemeClr val="lt1"/>
+              </a:fillRef>
+              <a:effectRef idx="0">
+                <a:schemeClr val="dk1"/>
+              </a:effectRef>
+              <a:fontRef idx="minor">
+                <a:schemeClr val="dk1"/>
+              </a:fontRef>
+            </p:style>
+            <p:txBody>
+              <a:bodyPr rot="0" spcFirstLastPara="0" vert="horz" wrap="square" lIns="91440" tIns="45720" rIns="91440" bIns="45720" numCol="1" spcCol="0" rtlCol="0" fromWordArt="0" anchor="ctr" anchorCtr="0" forceAA="0" compatLnSpc="1">
+                <a:prstTxWarp prst="textNoShape">
+                  <a:avLst/>
+                </a:prstTxWarp>
+                <a:noAutofit/>
+              </a:bodyPr>
+              <a:lstStyle>
+                <a:defPPr>
+                  <a:defRPr lang="zh-CN"/>
+                </a:defPPr>
+                <a:lvl1pPr marL="0" algn="l" defTabSz="914400" rtl="0" eaLnBrk="1" latinLnBrk="0" hangingPunct="1">
+                  <a:defRPr sz="1800" kern="1200">
+                    <a:solidFill>
+                      <a:schemeClr val="dk1"/>
+                    </a:solidFill>
+                    <a:latin typeface="+mn-lt"/>
+                    <a:ea typeface="+mn-ea"/>
+                    <a:cs typeface="+mn-cs"/>
+                  </a:defRPr>
+                </a:lvl1pPr>
+                <a:lvl2pPr marL="457200" algn="l" defTabSz="914400" rtl="0" eaLnBrk="1" latinLnBrk="0" hangingPunct="1">
+                  <a:defRPr sz="1800" kern="1200">
+                    <a:solidFill>
+                      <a:schemeClr val="dk1"/>
+                    </a:solidFill>
+                    <a:latin typeface="+mn-lt"/>
+                    <a:ea typeface="+mn-ea"/>
+                    <a:cs typeface="+mn-cs"/>
+                  </a:defRPr>
+                </a:lvl2pPr>
+                <a:lvl3pPr marL="914400" algn="l" defTabSz="914400" rtl="0" eaLnBrk="1" latinLnBrk="0" hangingPunct="1">
+                  <a:defRPr sz="1800" kern="1200">
+                    <a:solidFill>
+                      <a:schemeClr val="dk1"/>
+                    </a:solidFill>
+                    <a:latin typeface="+mn-lt"/>
+                    <a:ea typeface="+mn-ea"/>
+                    <a:cs typeface="+mn-cs"/>
+                  </a:defRPr>
+                </a:lvl3pPr>
+                <a:lvl4pPr marL="1371600" algn="l" defTabSz="914400" rtl="0" eaLnBrk="1" latinLnBrk="0" hangingPunct="1">
+                  <a:defRPr sz="1800" kern="1200">
+                    <a:solidFill>
+                      <a:schemeClr val="dk1"/>
+                    </a:solidFill>
+                    <a:latin typeface="+mn-lt"/>
+                    <a:ea typeface="+mn-ea"/>
+                    <a:cs typeface="+mn-cs"/>
+                  </a:defRPr>
+                </a:lvl4pPr>
+                <a:lvl5pPr marL="1828800" algn="l" defTabSz="914400" rtl="0" eaLnBrk="1" latinLnBrk="0" hangingPunct="1">
+                  <a:defRPr sz="1800" kern="1200">
+                    <a:solidFill>
+                      <a:schemeClr val="dk1"/>
+                    </a:solidFill>
+                    <a:latin typeface="+mn-lt"/>
+                    <a:ea typeface="+mn-ea"/>
+                    <a:cs typeface="+mn-cs"/>
+                  </a:defRPr>
+                </a:lvl5pPr>
+                <a:lvl6pPr marL="2286000" algn="l" defTabSz="914400" rtl="0" eaLnBrk="1" latinLnBrk="0" hangingPunct="1">
+                  <a:defRPr sz="1800" kern="1200">
+                    <a:solidFill>
+                      <a:schemeClr val="dk1"/>
+                    </a:solidFill>
+                    <a:latin typeface="+mn-lt"/>
+                    <a:ea typeface="+mn-ea"/>
+                    <a:cs typeface="+mn-cs"/>
+                  </a:defRPr>
+                </a:lvl6pPr>
+                <a:lvl7pPr marL="2743200" algn="l" defTabSz="914400" rtl="0" eaLnBrk="1" latinLnBrk="0" hangingPunct="1">
+                  <a:defRPr sz="1800" kern="1200">
+                    <a:solidFill>
+                      <a:schemeClr val="dk1"/>
+                    </a:solidFill>
+                    <a:latin typeface="+mn-lt"/>
+                    <a:ea typeface="+mn-ea"/>
+                    <a:cs typeface="+mn-cs"/>
+                  </a:defRPr>
+                </a:lvl7pPr>
+                <a:lvl8pPr marL="3200400" algn="l" defTabSz="914400" rtl="0" eaLnBrk="1" latinLnBrk="0" hangingPunct="1">
+                  <a:defRPr sz="1800" kern="1200">
+                    <a:solidFill>
+                      <a:schemeClr val="dk1"/>
+                    </a:solidFill>
+                    <a:latin typeface="+mn-lt"/>
+                    <a:ea typeface="+mn-ea"/>
+                    <a:cs typeface="+mn-cs"/>
+                  </a:defRPr>
+                </a:lvl8pPr>
+                <a:lvl9pPr marL="3657600" algn="l" defTabSz="914400" rtl="0" eaLnBrk="1" latinLnBrk="0" hangingPunct="1">
+                  <a:defRPr sz="1800" kern="1200">
+                    <a:solidFill>
+                      <a:schemeClr val="dk1"/>
+                    </a:solidFill>
+                    <a:latin typeface="+mn-lt"/>
+                    <a:ea typeface="+mn-ea"/>
+                    <a:cs typeface="+mn-cs"/>
+                  </a:defRPr>
+                </a:lvl9pPr>
+              </a:lstStyle>
+              <a:p>
+                <a:pPr algn="ctr"/>
+                <a:r>
+                  <a:rPr lang="en-US" altLang="zh-CN" sz="800" dirty="0" smtClean="0"/>
+                  <a:t>Container</a:t>
+                </a:r>
+                <a:endParaRPr lang="zh-CN" altLang="en-US" sz="800" dirty="0"/>
+              </a:p>
+            </p:txBody>
+          </p:sp>
+        </p:grpSp>
+        <p:grpSp>
+          <p:nvGrpSpPr>
+            <p:cNvPr id="65" name="组合 64"/>
+            <p:cNvGrpSpPr/>
+            <p:nvPr/>
+          </p:nvGrpSpPr>
+          <p:grpSpPr>
+            <a:xfrm>
+              <a:off x="6327132" y="1336525"/>
+              <a:ext cx="1379220" cy="586740"/>
+              <a:chOff x="3459480" y="3543300"/>
+              <a:chExt cx="1379220" cy="586740"/>
+            </a:xfrm>
+          </p:grpSpPr>
+          <p:sp>
+            <p:nvSpPr>
+              <p:cNvPr id="75" name="圆角矩形 74"/>
+              <p:cNvSpPr/>
+              <p:nvPr/>
+            </p:nvSpPr>
+            <p:spPr>
+              <a:xfrm>
+                <a:off x="3459480" y="3543300"/>
+                <a:ext cx="1379220" cy="586740"/>
+              </a:xfrm>
+              <a:prstGeom prst="roundRect">
+                <a:avLst/>
+              </a:prstGeom>
+            </p:spPr>
+            <p:style>
+              <a:lnRef idx="2">
+                <a:schemeClr val="dk1"/>
+              </a:lnRef>
+              <a:fillRef idx="1">
+                <a:schemeClr val="lt1"/>
+              </a:fillRef>
+              <a:effectRef idx="0">
+                <a:schemeClr val="dk1"/>
+              </a:effectRef>
+              <a:fontRef idx="minor">
+                <a:schemeClr val="dk1"/>
+              </a:fontRef>
+            </p:style>
+            <p:txBody>
+              <a:bodyPr rot="0" spcFirstLastPara="0" vert="horz" wrap="square" lIns="91440" tIns="45720" rIns="91440" bIns="45720" numCol="1" spcCol="0" rtlCol="0" fromWordArt="0" anchor="t" anchorCtr="0" forceAA="0" compatLnSpc="1">
+                <a:prstTxWarp prst="textNoShape">
+                  <a:avLst/>
+                </a:prstTxWarp>
+                <a:noAutofit/>
+              </a:bodyPr>
+              <a:lstStyle>
+                <a:defPPr>
+                  <a:defRPr lang="zh-CN"/>
+                </a:defPPr>
+                <a:lvl1pPr marL="0" algn="l" defTabSz="914400" rtl="0" eaLnBrk="1" latinLnBrk="0" hangingPunct="1">
+                  <a:defRPr sz="1800" kern="1200">
+                    <a:solidFill>
+                      <a:schemeClr val="dk1"/>
+                    </a:solidFill>
+                    <a:latin typeface="+mn-lt"/>
+                    <a:ea typeface="+mn-ea"/>
+                    <a:cs typeface="+mn-cs"/>
+                  </a:defRPr>
+                </a:lvl1pPr>
+                <a:lvl2pPr marL="457200" algn="l" defTabSz="914400" rtl="0" eaLnBrk="1" latinLnBrk="0" hangingPunct="1">
+                  <a:defRPr sz="1800" kern="1200">
+                    <a:solidFill>
+                      <a:schemeClr val="dk1"/>
+                    </a:solidFill>
+                    <a:latin typeface="+mn-lt"/>
+                    <a:ea typeface="+mn-ea"/>
+                    <a:cs typeface="+mn-cs"/>
+                  </a:defRPr>
+                </a:lvl2pPr>
+                <a:lvl3pPr marL="914400" algn="l" defTabSz="914400" rtl="0" eaLnBrk="1" latinLnBrk="0" hangingPunct="1">
+                  <a:defRPr sz="1800" kern="1200">
+                    <a:solidFill>
+                      <a:schemeClr val="dk1"/>
+                    </a:solidFill>
+                    <a:latin typeface="+mn-lt"/>
+                    <a:ea typeface="+mn-ea"/>
+                    <a:cs typeface="+mn-cs"/>
+                  </a:defRPr>
+                </a:lvl3pPr>
+                <a:lvl4pPr marL="1371600" algn="l" defTabSz="914400" rtl="0" eaLnBrk="1" latinLnBrk="0" hangingPunct="1">
+                  <a:defRPr sz="1800" kern="1200">
+                    <a:solidFill>
+                      <a:schemeClr val="dk1"/>
+                    </a:solidFill>
+                    <a:latin typeface="+mn-lt"/>
+                    <a:ea typeface="+mn-ea"/>
+                    <a:cs typeface="+mn-cs"/>
+                  </a:defRPr>
+                </a:lvl4pPr>
+                <a:lvl5pPr marL="1828800" algn="l" defTabSz="914400" rtl="0" eaLnBrk="1" latinLnBrk="0" hangingPunct="1">
+                  <a:defRPr sz="1800" kern="1200">
+                    <a:solidFill>
+                      <a:schemeClr val="dk1"/>
+                    </a:solidFill>
+                    <a:latin typeface="+mn-lt"/>
+                    <a:ea typeface="+mn-ea"/>
+                    <a:cs typeface="+mn-cs"/>
+                  </a:defRPr>
+                </a:lvl5pPr>
+                <a:lvl6pPr marL="2286000" algn="l" defTabSz="914400" rtl="0" eaLnBrk="1" latinLnBrk="0" hangingPunct="1">
+                  <a:defRPr sz="1800" kern="1200">
+                    <a:solidFill>
+                      <a:schemeClr val="dk1"/>
+                    </a:solidFill>
+                    <a:latin typeface="+mn-lt"/>
+                    <a:ea typeface="+mn-ea"/>
+                    <a:cs typeface="+mn-cs"/>
+                  </a:defRPr>
+                </a:lvl6pPr>
+                <a:lvl7pPr marL="2743200" algn="l" defTabSz="914400" rtl="0" eaLnBrk="1" latinLnBrk="0" hangingPunct="1">
+                  <a:defRPr sz="1800" kern="1200">
+                    <a:solidFill>
+                      <a:schemeClr val="dk1"/>
+                    </a:solidFill>
+                    <a:latin typeface="+mn-lt"/>
+                    <a:ea typeface="+mn-ea"/>
+                    <a:cs typeface="+mn-cs"/>
+                  </a:defRPr>
+                </a:lvl7pPr>
+                <a:lvl8pPr marL="3200400" algn="l" defTabSz="914400" rtl="0" eaLnBrk="1" latinLnBrk="0" hangingPunct="1">
+                  <a:defRPr sz="1800" kern="1200">
+                    <a:solidFill>
+                      <a:schemeClr val="dk1"/>
+                    </a:solidFill>
+                    <a:latin typeface="+mn-lt"/>
+                    <a:ea typeface="+mn-ea"/>
+                    <a:cs typeface="+mn-cs"/>
+                  </a:defRPr>
+                </a:lvl8pPr>
+                <a:lvl9pPr marL="3657600" algn="l" defTabSz="914400" rtl="0" eaLnBrk="1" latinLnBrk="0" hangingPunct="1">
+                  <a:defRPr sz="1800" kern="1200">
+                    <a:solidFill>
+                      <a:schemeClr val="dk1"/>
+                    </a:solidFill>
+                    <a:latin typeface="+mn-lt"/>
+                    <a:ea typeface="+mn-ea"/>
+                    <a:cs typeface="+mn-cs"/>
+                  </a:defRPr>
+                </a:lvl9pPr>
+              </a:lstStyle>
+              <a:p>
+                <a:pPr algn="ctr"/>
+                <a:r>
+                  <a:rPr lang="en-US" altLang="zh-CN" sz="1200" dirty="0" smtClean="0"/>
+                  <a:t>NM</a:t>
+                </a:r>
+              </a:p>
+            </p:txBody>
+          </p:sp>
+          <p:sp>
+            <p:nvSpPr>
+              <p:cNvPr id="76" name="矩形 75"/>
+              <p:cNvSpPr/>
+              <p:nvPr/>
+            </p:nvSpPr>
+            <p:spPr>
+              <a:xfrm>
+                <a:off x="3505200" y="3830955"/>
+                <a:ext cx="609600" cy="240030"/>
+              </a:xfrm>
+              <a:prstGeom prst="rect">
+                <a:avLst/>
+              </a:prstGeom>
+            </p:spPr>
+            <p:style>
+              <a:lnRef idx="2">
+                <a:schemeClr val="dk1"/>
+              </a:lnRef>
+              <a:fillRef idx="1">
+                <a:schemeClr val="lt1"/>
+              </a:fillRef>
+              <a:effectRef idx="0">
+                <a:schemeClr val="dk1"/>
+              </a:effectRef>
+              <a:fontRef idx="minor">
+                <a:schemeClr val="dk1"/>
+              </a:fontRef>
+            </p:style>
+            <p:txBody>
+              <a:bodyPr rot="0" spcFirstLastPara="0" vert="horz" wrap="square" lIns="91440" tIns="45720" rIns="91440" bIns="45720" numCol="1" spcCol="0" rtlCol="0" fromWordArt="0" anchor="ctr" anchorCtr="0" forceAA="0" compatLnSpc="1">
+                <a:prstTxWarp prst="textNoShape">
+                  <a:avLst/>
+                </a:prstTxWarp>
+                <a:noAutofit/>
+              </a:bodyPr>
+              <a:lstStyle>
+                <a:defPPr>
+                  <a:defRPr lang="zh-CN"/>
+                </a:defPPr>
+                <a:lvl1pPr marL="0" algn="l" defTabSz="914400" rtl="0" eaLnBrk="1" latinLnBrk="0" hangingPunct="1">
+                  <a:defRPr sz="1800" kern="1200">
+                    <a:solidFill>
+                      <a:schemeClr val="dk1"/>
+                    </a:solidFill>
+                    <a:latin typeface="+mn-lt"/>
+                    <a:ea typeface="+mn-ea"/>
+                    <a:cs typeface="+mn-cs"/>
+                  </a:defRPr>
+                </a:lvl1pPr>
+                <a:lvl2pPr marL="457200" algn="l" defTabSz="914400" rtl="0" eaLnBrk="1" latinLnBrk="0" hangingPunct="1">
+                  <a:defRPr sz="1800" kern="1200">
+                    <a:solidFill>
+                      <a:schemeClr val="dk1"/>
+                    </a:solidFill>
+                    <a:latin typeface="+mn-lt"/>
+                    <a:ea typeface="+mn-ea"/>
+                    <a:cs typeface="+mn-cs"/>
+                  </a:defRPr>
+                </a:lvl2pPr>
+                <a:lvl3pPr marL="914400" algn="l" defTabSz="914400" rtl="0" eaLnBrk="1" latinLnBrk="0" hangingPunct="1">
+                  <a:defRPr sz="1800" kern="1200">
+                    <a:solidFill>
+                      <a:schemeClr val="dk1"/>
+                    </a:solidFill>
+                    <a:latin typeface="+mn-lt"/>
+                    <a:ea typeface="+mn-ea"/>
+                    <a:cs typeface="+mn-cs"/>
+                  </a:defRPr>
+                </a:lvl3pPr>
+                <a:lvl4pPr marL="1371600" algn="l" defTabSz="914400" rtl="0" eaLnBrk="1" latinLnBrk="0" hangingPunct="1">
+                  <a:defRPr sz="1800" kern="1200">
+                    <a:solidFill>
+                      <a:schemeClr val="dk1"/>
+                    </a:solidFill>
+                    <a:latin typeface="+mn-lt"/>
+                    <a:ea typeface="+mn-ea"/>
+                    <a:cs typeface="+mn-cs"/>
+                  </a:defRPr>
+                </a:lvl4pPr>
+                <a:lvl5pPr marL="1828800" algn="l" defTabSz="914400" rtl="0" eaLnBrk="1" latinLnBrk="0" hangingPunct="1">
+                  <a:defRPr sz="1800" kern="1200">
+                    <a:solidFill>
+                      <a:schemeClr val="dk1"/>
+                    </a:solidFill>
+                    <a:latin typeface="+mn-lt"/>
+                    <a:ea typeface="+mn-ea"/>
+                    <a:cs typeface="+mn-cs"/>
+                  </a:defRPr>
+                </a:lvl5pPr>
+                <a:lvl6pPr marL="2286000" algn="l" defTabSz="914400" rtl="0" eaLnBrk="1" latinLnBrk="0" hangingPunct="1">
+                  <a:defRPr sz="1800" kern="1200">
+                    <a:solidFill>
+                      <a:schemeClr val="dk1"/>
+                    </a:solidFill>
+                    <a:latin typeface="+mn-lt"/>
+                    <a:ea typeface="+mn-ea"/>
+                    <a:cs typeface="+mn-cs"/>
+                  </a:defRPr>
+                </a:lvl6pPr>
+                <a:lvl7pPr marL="2743200" algn="l" defTabSz="914400" rtl="0" eaLnBrk="1" latinLnBrk="0" hangingPunct="1">
+                  <a:defRPr sz="1800" kern="1200">
+                    <a:solidFill>
+                      <a:schemeClr val="dk1"/>
+                    </a:solidFill>
+                    <a:latin typeface="+mn-lt"/>
+                    <a:ea typeface="+mn-ea"/>
+                    <a:cs typeface="+mn-cs"/>
+                  </a:defRPr>
+                </a:lvl7pPr>
+                <a:lvl8pPr marL="3200400" algn="l" defTabSz="914400" rtl="0" eaLnBrk="1" latinLnBrk="0" hangingPunct="1">
+                  <a:defRPr sz="1800" kern="1200">
+                    <a:solidFill>
+                      <a:schemeClr val="dk1"/>
+                    </a:solidFill>
+                    <a:latin typeface="+mn-lt"/>
+                    <a:ea typeface="+mn-ea"/>
+                    <a:cs typeface="+mn-cs"/>
+                  </a:defRPr>
+                </a:lvl8pPr>
+                <a:lvl9pPr marL="3657600" algn="l" defTabSz="914400" rtl="0" eaLnBrk="1" latinLnBrk="0" hangingPunct="1">
+                  <a:defRPr sz="1800" kern="1200">
+                    <a:solidFill>
+                      <a:schemeClr val="dk1"/>
+                    </a:solidFill>
+                    <a:latin typeface="+mn-lt"/>
+                    <a:ea typeface="+mn-ea"/>
+                    <a:cs typeface="+mn-cs"/>
+                  </a:defRPr>
+                </a:lvl9pPr>
+              </a:lstStyle>
+              <a:p>
+                <a:pPr algn="ctr"/>
+                <a:r>
+                  <a:rPr lang="en-US" altLang="zh-CN" sz="800" dirty="0" err="1" smtClean="0"/>
+                  <a:t>AppMstr</a:t>
+                </a:r>
+                <a:endParaRPr lang="zh-CN" altLang="en-US" sz="800" dirty="0"/>
+              </a:p>
+            </p:txBody>
+          </p:sp>
+          <p:sp>
+            <p:nvSpPr>
+              <p:cNvPr id="77" name="矩形 76"/>
+              <p:cNvSpPr/>
+              <p:nvPr/>
+            </p:nvSpPr>
+            <p:spPr>
+              <a:xfrm>
+                <a:off x="4149090" y="3830955"/>
+                <a:ext cx="609600" cy="240030"/>
+              </a:xfrm>
+              <a:prstGeom prst="rect">
+                <a:avLst/>
+              </a:prstGeom>
+            </p:spPr>
+            <p:style>
+              <a:lnRef idx="2">
+                <a:schemeClr val="dk1"/>
+              </a:lnRef>
+              <a:fillRef idx="1">
+                <a:schemeClr val="lt1"/>
+              </a:fillRef>
+              <a:effectRef idx="0">
+                <a:schemeClr val="dk1"/>
+              </a:effectRef>
+              <a:fontRef idx="minor">
+                <a:schemeClr val="dk1"/>
+              </a:fontRef>
+            </p:style>
+            <p:txBody>
+              <a:bodyPr rot="0" spcFirstLastPara="0" vert="horz" wrap="square" lIns="91440" tIns="45720" rIns="91440" bIns="45720" numCol="1" spcCol="0" rtlCol="0" fromWordArt="0" anchor="ctr" anchorCtr="0" forceAA="0" compatLnSpc="1">
+                <a:prstTxWarp prst="textNoShape">
+                  <a:avLst/>
+                </a:prstTxWarp>
+                <a:noAutofit/>
+              </a:bodyPr>
+              <a:lstStyle>
+                <a:defPPr>
+                  <a:defRPr lang="zh-CN"/>
+                </a:defPPr>
+                <a:lvl1pPr marL="0" algn="l" defTabSz="914400" rtl="0" eaLnBrk="1" latinLnBrk="0" hangingPunct="1">
+                  <a:defRPr sz="1800" kern="1200">
+                    <a:solidFill>
+                      <a:schemeClr val="dk1"/>
+                    </a:solidFill>
+                    <a:latin typeface="+mn-lt"/>
+                    <a:ea typeface="+mn-ea"/>
+                    <a:cs typeface="+mn-cs"/>
+                  </a:defRPr>
+                </a:lvl1pPr>
+                <a:lvl2pPr marL="457200" algn="l" defTabSz="914400" rtl="0" eaLnBrk="1" latinLnBrk="0" hangingPunct="1">
+                  <a:defRPr sz="1800" kern="1200">
+                    <a:solidFill>
+                      <a:schemeClr val="dk1"/>
+                    </a:solidFill>
+                    <a:latin typeface="+mn-lt"/>
+                    <a:ea typeface="+mn-ea"/>
+                    <a:cs typeface="+mn-cs"/>
+                  </a:defRPr>
+                </a:lvl2pPr>
+                <a:lvl3pPr marL="914400" algn="l" defTabSz="914400" rtl="0" eaLnBrk="1" latinLnBrk="0" hangingPunct="1">
+                  <a:defRPr sz="1800" kern="1200">
+                    <a:solidFill>
+                      <a:schemeClr val="dk1"/>
+                    </a:solidFill>
+                    <a:latin typeface="+mn-lt"/>
+                    <a:ea typeface="+mn-ea"/>
+                    <a:cs typeface="+mn-cs"/>
+                  </a:defRPr>
+                </a:lvl3pPr>
+                <a:lvl4pPr marL="1371600" algn="l" defTabSz="914400" rtl="0" eaLnBrk="1" latinLnBrk="0" hangingPunct="1">
+                  <a:defRPr sz="1800" kern="1200">
+                    <a:solidFill>
+                      <a:schemeClr val="dk1"/>
+                    </a:solidFill>
+                    <a:latin typeface="+mn-lt"/>
+                    <a:ea typeface="+mn-ea"/>
+                    <a:cs typeface="+mn-cs"/>
+                  </a:defRPr>
+                </a:lvl4pPr>
+                <a:lvl5pPr marL="1828800" algn="l" defTabSz="914400" rtl="0" eaLnBrk="1" latinLnBrk="0" hangingPunct="1">
+                  <a:defRPr sz="1800" kern="1200">
+                    <a:solidFill>
+                      <a:schemeClr val="dk1"/>
+                    </a:solidFill>
+                    <a:latin typeface="+mn-lt"/>
+                    <a:ea typeface="+mn-ea"/>
+                    <a:cs typeface="+mn-cs"/>
+                  </a:defRPr>
+                </a:lvl5pPr>
+                <a:lvl6pPr marL="2286000" algn="l" defTabSz="914400" rtl="0" eaLnBrk="1" latinLnBrk="0" hangingPunct="1">
+                  <a:defRPr sz="1800" kern="1200">
+                    <a:solidFill>
+                      <a:schemeClr val="dk1"/>
+                    </a:solidFill>
+                    <a:latin typeface="+mn-lt"/>
+                    <a:ea typeface="+mn-ea"/>
+                    <a:cs typeface="+mn-cs"/>
+                  </a:defRPr>
+                </a:lvl6pPr>
+                <a:lvl7pPr marL="2743200" algn="l" defTabSz="914400" rtl="0" eaLnBrk="1" latinLnBrk="0" hangingPunct="1">
+                  <a:defRPr sz="1800" kern="1200">
+                    <a:solidFill>
+                      <a:schemeClr val="dk1"/>
+                    </a:solidFill>
+                    <a:latin typeface="+mn-lt"/>
+                    <a:ea typeface="+mn-ea"/>
+                    <a:cs typeface="+mn-cs"/>
+                  </a:defRPr>
+                </a:lvl7pPr>
+                <a:lvl8pPr marL="3200400" algn="l" defTabSz="914400" rtl="0" eaLnBrk="1" latinLnBrk="0" hangingPunct="1">
+                  <a:defRPr sz="1800" kern="1200">
+                    <a:solidFill>
+                      <a:schemeClr val="dk1"/>
+                    </a:solidFill>
+                    <a:latin typeface="+mn-lt"/>
+                    <a:ea typeface="+mn-ea"/>
+                    <a:cs typeface="+mn-cs"/>
+                  </a:defRPr>
+                </a:lvl8pPr>
+                <a:lvl9pPr marL="3657600" algn="l" defTabSz="914400" rtl="0" eaLnBrk="1" latinLnBrk="0" hangingPunct="1">
+                  <a:defRPr sz="1800" kern="1200">
+                    <a:solidFill>
+                      <a:schemeClr val="dk1"/>
+                    </a:solidFill>
+                    <a:latin typeface="+mn-lt"/>
+                    <a:ea typeface="+mn-ea"/>
+                    <a:cs typeface="+mn-cs"/>
+                  </a:defRPr>
+                </a:lvl9pPr>
+              </a:lstStyle>
+              <a:p>
+                <a:pPr algn="ctr"/>
+                <a:r>
+                  <a:rPr lang="en-US" altLang="zh-CN" sz="800" dirty="0" smtClean="0"/>
+                  <a:t>Container</a:t>
+                </a:r>
+                <a:endParaRPr lang="zh-CN" altLang="en-US" sz="800" dirty="0"/>
+              </a:p>
+            </p:txBody>
+          </p:sp>
+        </p:grpSp>
+        <p:sp>
+          <p:nvSpPr>
+            <p:cNvPr id="66" name="圆角矩形 65"/>
+            <p:cNvSpPr/>
+            <p:nvPr/>
+          </p:nvSpPr>
+          <p:spPr>
+            <a:xfrm>
+              <a:off x="4720964" y="437055"/>
+              <a:ext cx="982980" cy="685242"/>
+            </a:xfrm>
+            <a:prstGeom prst="roundRect">
+              <a:avLst/>
+            </a:prstGeom>
+          </p:spPr>
+          <p:style>
+            <a:lnRef idx="2">
+              <a:schemeClr val="dk1"/>
+            </a:lnRef>
+            <a:fillRef idx="1">
+              <a:schemeClr val="lt1"/>
+            </a:fillRef>
+            <a:effectRef idx="0">
+              <a:schemeClr val="dk1"/>
+            </a:effectRef>
+            <a:fontRef idx="minor">
+              <a:schemeClr val="dk1"/>
+            </a:fontRef>
+          </p:style>
+          <p:txBody>
+            <a:bodyPr rot="0" spcFirstLastPara="0" vert="horz" wrap="square" lIns="91440" tIns="45720" rIns="91440" bIns="45720" numCol="1" spcCol="0" rtlCol="0" fromWordArt="0" anchor="ctr" anchorCtr="0" forceAA="0" compatLnSpc="1">
+              <a:prstTxWarp prst="textNoShape">
+                <a:avLst/>
+              </a:prstTxWarp>
+              <a:noAutofit/>
+            </a:bodyPr>
+            <a:lstStyle>
+              <a:defPPr>
+                <a:defRPr lang="zh-CN"/>
+              </a:defPPr>
+              <a:lvl1pPr marL="0" algn="l" defTabSz="914400" rtl="0" eaLnBrk="1" latinLnBrk="0" hangingPunct="1">
+                <a:defRPr sz="1800" kern="1200">
+                  <a:solidFill>
+                    <a:schemeClr val="dk1"/>
+                  </a:solidFill>
+                  <a:latin typeface="+mn-lt"/>
+                  <a:ea typeface="+mn-ea"/>
+                  <a:cs typeface="+mn-cs"/>
+                </a:defRPr>
+              </a:lvl1pPr>
+              <a:lvl2pPr marL="457200" algn="l" defTabSz="914400" rtl="0" eaLnBrk="1" latinLnBrk="0" hangingPunct="1">
+                <a:defRPr sz="1800" kern="1200">
+                  <a:solidFill>
+                    <a:schemeClr val="dk1"/>
+                  </a:solidFill>
+                  <a:latin typeface="+mn-lt"/>
+                  <a:ea typeface="+mn-ea"/>
+                  <a:cs typeface="+mn-cs"/>
+                </a:defRPr>
+              </a:lvl2pPr>
+              <a:lvl3pPr marL="914400" algn="l" defTabSz="914400" rtl="0" eaLnBrk="1" latinLnBrk="0" hangingPunct="1">
+                <a:defRPr sz="1800" kern="1200">
+                  <a:solidFill>
+                    <a:schemeClr val="dk1"/>
+                  </a:solidFill>
+                  <a:latin typeface="+mn-lt"/>
+                  <a:ea typeface="+mn-ea"/>
+                  <a:cs typeface="+mn-cs"/>
+                </a:defRPr>
+              </a:lvl3pPr>
+              <a:lvl4pPr marL="1371600" algn="l" defTabSz="914400" rtl="0" eaLnBrk="1" latinLnBrk="0" hangingPunct="1">
+                <a:defRPr sz="1800" kern="1200">
+                  <a:solidFill>
+                    <a:schemeClr val="dk1"/>
+                  </a:solidFill>
+                  <a:latin typeface="+mn-lt"/>
+                  <a:ea typeface="+mn-ea"/>
+                  <a:cs typeface="+mn-cs"/>
+                </a:defRPr>
+              </a:lvl4pPr>
+              <a:lvl5pPr marL="1828800" algn="l" defTabSz="914400" rtl="0" eaLnBrk="1" latinLnBrk="0" hangingPunct="1">
+                <a:defRPr sz="1800" kern="1200">
+                  <a:solidFill>
+                    <a:schemeClr val="dk1"/>
+                  </a:solidFill>
+                  <a:latin typeface="+mn-lt"/>
+                  <a:ea typeface="+mn-ea"/>
+                  <a:cs typeface="+mn-cs"/>
+                </a:defRPr>
+              </a:lvl5pPr>
+              <a:lvl6pPr marL="2286000" algn="l" defTabSz="914400" rtl="0" eaLnBrk="1" latinLnBrk="0" hangingPunct="1">
+                <a:defRPr sz="1800" kern="1200">
+                  <a:solidFill>
+                    <a:schemeClr val="dk1"/>
+                  </a:solidFill>
+                  <a:latin typeface="+mn-lt"/>
+                  <a:ea typeface="+mn-ea"/>
+                  <a:cs typeface="+mn-cs"/>
+                </a:defRPr>
+              </a:lvl6pPr>
+              <a:lvl7pPr marL="2743200" algn="l" defTabSz="914400" rtl="0" eaLnBrk="1" latinLnBrk="0" hangingPunct="1">
+                <a:defRPr sz="1800" kern="1200">
+                  <a:solidFill>
+                    <a:schemeClr val="dk1"/>
+                  </a:solidFill>
+                  <a:latin typeface="+mn-lt"/>
+                  <a:ea typeface="+mn-ea"/>
+                  <a:cs typeface="+mn-cs"/>
+                </a:defRPr>
+              </a:lvl7pPr>
+              <a:lvl8pPr marL="3200400" algn="l" defTabSz="914400" rtl="0" eaLnBrk="1" latinLnBrk="0" hangingPunct="1">
+                <a:defRPr sz="1800" kern="1200">
+                  <a:solidFill>
+                    <a:schemeClr val="dk1"/>
+                  </a:solidFill>
+                  <a:latin typeface="+mn-lt"/>
+                  <a:ea typeface="+mn-ea"/>
+                  <a:cs typeface="+mn-cs"/>
+                </a:defRPr>
+              </a:lvl8pPr>
+              <a:lvl9pPr marL="3657600" algn="l" defTabSz="914400" rtl="0" eaLnBrk="1" latinLnBrk="0" hangingPunct="1">
+                <a:defRPr sz="1800" kern="1200">
+                  <a:solidFill>
+                    <a:schemeClr val="dk1"/>
+                  </a:solidFill>
+                  <a:latin typeface="+mn-lt"/>
+                  <a:ea typeface="+mn-ea"/>
+                  <a:cs typeface="+mn-cs"/>
+                </a:defRPr>
+              </a:lvl9pPr>
+            </a:lstStyle>
+            <a:p>
+              <a:pPr algn="ctr"/>
+              <a:r>
+                <a:rPr lang="en-US" altLang="zh-CN" sz="1000" dirty="0" smtClean="0"/>
+                <a:t>Name Service</a:t>
+              </a:r>
+              <a:endParaRPr lang="zh-CN" altLang="en-US" sz="1000" dirty="0"/>
+            </a:p>
+          </p:txBody>
+        </p:sp>
+        <p:cxnSp>
+          <p:nvCxnSpPr>
+            <p:cNvPr id="67" name="直接箭头连接符 66"/>
+            <p:cNvCxnSpPr>
+              <a:stCxn id="68" idx="0"/>
+              <a:endCxn id="66" idx="2"/>
+            </p:cNvCxnSpPr>
+            <p:nvPr/>
+          </p:nvCxnSpPr>
+          <p:spPr>
+            <a:xfrm flipV="1">
+              <a:off x="5107519" y="1122297"/>
+              <a:ext cx="104935" cy="551871"/>
+            </a:xfrm>
+            <a:prstGeom prst="straightConnector1">
+              <a:avLst/>
+            </a:prstGeom>
+            <a:ln>
+              <a:tailEnd type="triangle"/>
+            </a:ln>
+          </p:spPr>
+          <p:style>
+            <a:lnRef idx="1">
+              <a:schemeClr val="dk1"/>
+            </a:lnRef>
+            <a:fillRef idx="0">
+              <a:schemeClr val="dk1"/>
+            </a:fillRef>
+            <a:effectRef idx="0">
+              <a:schemeClr val="dk1"/>
+            </a:effectRef>
+            <a:fontRef idx="minor">
+              <a:schemeClr val="tx1"/>
+            </a:fontRef>
+          </p:style>
+        </p:cxnSp>
+        <p:sp>
+          <p:nvSpPr>
+            <p:cNvPr id="68" name="椭圆 67"/>
+            <p:cNvSpPr/>
+            <p:nvPr/>
+          </p:nvSpPr>
+          <p:spPr>
+            <a:xfrm>
+              <a:off x="4722802" y="1674168"/>
+              <a:ext cx="769434" cy="546409"/>
+            </a:xfrm>
+            <a:prstGeom prst="ellipse">
+              <a:avLst/>
+            </a:prstGeom>
+          </p:spPr>
+          <p:style>
+            <a:lnRef idx="2">
+              <a:schemeClr val="dk1"/>
+            </a:lnRef>
+            <a:fillRef idx="1">
+              <a:schemeClr val="lt1"/>
+            </a:fillRef>
+            <a:effectRef idx="0">
+              <a:schemeClr val="dk1"/>
+            </a:effectRef>
+            <a:fontRef idx="minor">
+              <a:schemeClr val="dk1"/>
+            </a:fontRef>
+          </p:style>
+          <p:txBody>
+            <a:bodyPr rot="0" spcFirstLastPara="0" vert="horz" wrap="square" lIns="91440" tIns="45720" rIns="91440" bIns="45720" numCol="1" spcCol="0" rtlCol="0" fromWordArt="0" anchor="ctr" anchorCtr="0" forceAA="0" compatLnSpc="1">
+              <a:prstTxWarp prst="textNoShape">
+                <a:avLst/>
+              </a:prstTxWarp>
+              <a:noAutofit/>
+            </a:bodyPr>
+            <a:lstStyle>
+              <a:defPPr>
+                <a:defRPr lang="zh-CN"/>
+              </a:defPPr>
+              <a:lvl1pPr marL="0" algn="l" defTabSz="914400" rtl="0" eaLnBrk="1" latinLnBrk="0" hangingPunct="1">
+                <a:defRPr sz="1800" kern="1200">
+                  <a:solidFill>
+                    <a:schemeClr val="dk1"/>
+                  </a:solidFill>
+                  <a:latin typeface="+mn-lt"/>
+                  <a:ea typeface="+mn-ea"/>
+                  <a:cs typeface="+mn-cs"/>
+                </a:defRPr>
+              </a:lvl1pPr>
+              <a:lvl2pPr marL="457200" algn="l" defTabSz="914400" rtl="0" eaLnBrk="1" latinLnBrk="0" hangingPunct="1">
+                <a:defRPr sz="1800" kern="1200">
+                  <a:solidFill>
+                    <a:schemeClr val="dk1"/>
+                  </a:solidFill>
+                  <a:latin typeface="+mn-lt"/>
+                  <a:ea typeface="+mn-ea"/>
+                  <a:cs typeface="+mn-cs"/>
+                </a:defRPr>
+              </a:lvl2pPr>
+              <a:lvl3pPr marL="914400" algn="l" defTabSz="914400" rtl="0" eaLnBrk="1" latinLnBrk="0" hangingPunct="1">
+                <a:defRPr sz="1800" kern="1200">
+                  <a:solidFill>
+                    <a:schemeClr val="dk1"/>
+                  </a:solidFill>
+                  <a:latin typeface="+mn-lt"/>
+                  <a:ea typeface="+mn-ea"/>
+                  <a:cs typeface="+mn-cs"/>
+                </a:defRPr>
+              </a:lvl3pPr>
+              <a:lvl4pPr marL="1371600" algn="l" defTabSz="914400" rtl="0" eaLnBrk="1" latinLnBrk="0" hangingPunct="1">
+                <a:defRPr sz="1800" kern="1200">
+                  <a:solidFill>
+                    <a:schemeClr val="dk1"/>
+                  </a:solidFill>
+                  <a:latin typeface="+mn-lt"/>
+                  <a:ea typeface="+mn-ea"/>
+                  <a:cs typeface="+mn-cs"/>
+                </a:defRPr>
+              </a:lvl4pPr>
+              <a:lvl5pPr marL="1828800" algn="l" defTabSz="914400" rtl="0" eaLnBrk="1" latinLnBrk="0" hangingPunct="1">
+                <a:defRPr sz="1800" kern="1200">
+                  <a:solidFill>
+                    <a:schemeClr val="dk1"/>
+                  </a:solidFill>
+                  <a:latin typeface="+mn-lt"/>
+                  <a:ea typeface="+mn-ea"/>
+                  <a:cs typeface="+mn-cs"/>
+                </a:defRPr>
+              </a:lvl5pPr>
+              <a:lvl6pPr marL="2286000" algn="l" defTabSz="914400" rtl="0" eaLnBrk="1" latinLnBrk="0" hangingPunct="1">
+                <a:defRPr sz="1800" kern="1200">
+                  <a:solidFill>
+                    <a:schemeClr val="dk1"/>
+                  </a:solidFill>
+                  <a:latin typeface="+mn-lt"/>
+                  <a:ea typeface="+mn-ea"/>
+                  <a:cs typeface="+mn-cs"/>
+                </a:defRPr>
+              </a:lvl6pPr>
+              <a:lvl7pPr marL="2743200" algn="l" defTabSz="914400" rtl="0" eaLnBrk="1" latinLnBrk="0" hangingPunct="1">
+                <a:defRPr sz="1800" kern="1200">
+                  <a:solidFill>
+                    <a:schemeClr val="dk1"/>
+                  </a:solidFill>
+                  <a:latin typeface="+mn-lt"/>
+                  <a:ea typeface="+mn-ea"/>
+                  <a:cs typeface="+mn-cs"/>
+                </a:defRPr>
+              </a:lvl7pPr>
+              <a:lvl8pPr marL="3200400" algn="l" defTabSz="914400" rtl="0" eaLnBrk="1" latinLnBrk="0" hangingPunct="1">
+                <a:defRPr sz="1800" kern="1200">
+                  <a:solidFill>
+                    <a:schemeClr val="dk1"/>
+                  </a:solidFill>
+                  <a:latin typeface="+mn-lt"/>
+                  <a:ea typeface="+mn-ea"/>
+                  <a:cs typeface="+mn-cs"/>
+                </a:defRPr>
+              </a:lvl8pPr>
+              <a:lvl9pPr marL="3657600" algn="l" defTabSz="914400" rtl="0" eaLnBrk="1" latinLnBrk="0" hangingPunct="1">
+                <a:defRPr sz="1800" kern="1200">
+                  <a:solidFill>
+                    <a:schemeClr val="dk1"/>
+                  </a:solidFill>
+                  <a:latin typeface="+mn-lt"/>
+                  <a:ea typeface="+mn-ea"/>
+                  <a:cs typeface="+mn-cs"/>
+                </a:defRPr>
+              </a:lvl9pPr>
+            </a:lstStyle>
+            <a:p>
+              <a:pPr algn="ctr"/>
+              <a:r>
+                <a:rPr lang="en-US" altLang="zh-CN" sz="1000" dirty="0" smtClean="0">
+                  <a:latin typeface="Times New Roman" panose="02020603050405020304" pitchFamily="18" charset="0"/>
+                  <a:cs typeface="Times New Roman" panose="02020603050405020304" pitchFamily="18" charset="0"/>
+                </a:rPr>
+                <a:t>Client</a:t>
+              </a:r>
+              <a:endParaRPr lang="zh-CN" altLang="en-US" sz="1000" dirty="0">
+                <a:latin typeface="Times New Roman" panose="02020603050405020304" pitchFamily="18" charset="0"/>
+                <a:cs typeface="Times New Roman" panose="02020603050405020304" pitchFamily="18" charset="0"/>
+              </a:endParaRPr>
+            </a:p>
+          </p:txBody>
+        </p:sp>
+        <p:sp>
+          <p:nvSpPr>
+            <p:cNvPr id="69" name="文本框 37"/>
+            <p:cNvSpPr txBox="1"/>
+            <p:nvPr/>
+          </p:nvSpPr>
+          <p:spPr>
+            <a:xfrm>
+              <a:off x="5460836" y="1302570"/>
+              <a:ext cx="272670" cy="246221"/>
+            </a:xfrm>
+            <a:prstGeom prst="rect">
+              <a:avLst/>
+            </a:prstGeom>
+            <a:noFill/>
+          </p:spPr>
+          <p:txBody>
+            <a:bodyPr wrap="square" rtlCol="0">
+              <a:spAutoFit/>
+            </a:bodyPr>
+            <a:lstStyle>
+              <a:defPPr>
+                <a:defRPr lang="zh-CN"/>
+              </a:defPPr>
+              <a:lvl1pPr marL="0" algn="l" defTabSz="914400" rtl="0" eaLnBrk="1" latinLnBrk="0" hangingPunct="1">
+                <a:defRPr sz="1800" kern="1200">
+                  <a:solidFill>
+                    <a:schemeClr val="tx1"/>
+                  </a:solidFill>
+                  <a:latin typeface="+mn-lt"/>
+                  <a:ea typeface="+mn-ea"/>
+                  <a:cs typeface="+mn-cs"/>
+                </a:defRPr>
+              </a:lvl1pPr>
+              <a:lvl2pPr marL="457200" algn="l" defTabSz="914400" rtl="0" eaLnBrk="1" latinLnBrk="0" hangingPunct="1">
+                <a:defRPr sz="1800" kern="1200">
+                  <a:solidFill>
+                    <a:schemeClr val="tx1"/>
+                  </a:solidFill>
+                  <a:latin typeface="+mn-lt"/>
+                  <a:ea typeface="+mn-ea"/>
+                  <a:cs typeface="+mn-cs"/>
+                </a:defRPr>
+              </a:lvl2pPr>
+              <a:lvl3pPr marL="914400" algn="l" defTabSz="914400" rtl="0" eaLnBrk="1" latinLnBrk="0" hangingPunct="1">
+                <a:defRPr sz="1800" kern="1200">
+                  <a:solidFill>
+                    <a:schemeClr val="tx1"/>
+                  </a:solidFill>
+                  <a:latin typeface="+mn-lt"/>
+                  <a:ea typeface="+mn-ea"/>
+                  <a:cs typeface="+mn-cs"/>
+                </a:defRPr>
+              </a:lvl3pPr>
+              <a:lvl4pPr marL="1371600" algn="l" defTabSz="914400" rtl="0" eaLnBrk="1" latinLnBrk="0" hangingPunct="1">
+                <a:defRPr sz="1800" kern="1200">
+                  <a:solidFill>
+                    <a:schemeClr val="tx1"/>
+                  </a:solidFill>
+                  <a:latin typeface="+mn-lt"/>
+                  <a:ea typeface="+mn-ea"/>
+                  <a:cs typeface="+mn-cs"/>
+                </a:defRPr>
+              </a:lvl4pPr>
+              <a:lvl5pPr marL="1828800" algn="l" defTabSz="914400" rtl="0" eaLnBrk="1" latinLnBrk="0" hangingPunct="1">
+                <a:defRPr sz="1800" kern="1200">
+                  <a:solidFill>
+                    <a:schemeClr val="tx1"/>
+                  </a:solidFill>
+                  <a:latin typeface="+mn-lt"/>
+                  <a:ea typeface="+mn-ea"/>
+                  <a:cs typeface="+mn-cs"/>
+                </a:defRPr>
+              </a:lvl5pPr>
+              <a:lvl6pPr marL="2286000" algn="l" defTabSz="914400" rtl="0" eaLnBrk="1" latinLnBrk="0" hangingPunct="1">
+                <a:defRPr sz="1800" kern="1200">
+                  <a:solidFill>
+                    <a:schemeClr val="tx1"/>
+                  </a:solidFill>
+                  <a:latin typeface="+mn-lt"/>
+                  <a:ea typeface="+mn-ea"/>
+                  <a:cs typeface="+mn-cs"/>
+                </a:defRPr>
+              </a:lvl6pPr>
+              <a:lvl7pPr marL="2743200" algn="l" defTabSz="914400" rtl="0" eaLnBrk="1" latinLnBrk="0" hangingPunct="1">
+                <a:defRPr sz="1800" kern="1200">
+                  <a:solidFill>
+                    <a:schemeClr val="tx1"/>
+                  </a:solidFill>
+                  <a:latin typeface="+mn-lt"/>
+                  <a:ea typeface="+mn-ea"/>
+                  <a:cs typeface="+mn-cs"/>
+                </a:defRPr>
+              </a:lvl7pPr>
+              <a:lvl8pPr marL="3200400" algn="l" defTabSz="914400" rtl="0" eaLnBrk="1" latinLnBrk="0" hangingPunct="1">
+                <a:defRPr sz="1800" kern="1200">
+                  <a:solidFill>
+                    <a:schemeClr val="tx1"/>
+                  </a:solidFill>
+                  <a:latin typeface="+mn-lt"/>
+                  <a:ea typeface="+mn-ea"/>
+                  <a:cs typeface="+mn-cs"/>
+                </a:defRPr>
+              </a:lvl8pPr>
+              <a:lvl9pPr marL="3657600" algn="l" defTabSz="914400" rtl="0" eaLnBrk="1" latinLnBrk="0" hangingPunct="1">
+                <a:defRPr sz="1800" kern="1200">
+                  <a:solidFill>
+                    <a:schemeClr val="tx1"/>
+                  </a:solidFill>
+                  <a:latin typeface="+mn-lt"/>
+                  <a:ea typeface="+mn-ea"/>
+                  <a:cs typeface="+mn-cs"/>
+                </a:defRPr>
+              </a:lvl9pPr>
+            </a:lstStyle>
+            <a:p>
+              <a:r>
+                <a:rPr lang="en-US" altLang="zh-CN" sz="1000" dirty="0" smtClean="0">
+                  <a:latin typeface="Times New Roman" panose="02020603050405020304" pitchFamily="18" charset="0"/>
+                  <a:cs typeface="Times New Roman" panose="02020603050405020304" pitchFamily="18" charset="0"/>
+                </a:rPr>
+                <a:t>1</a:t>
+              </a:r>
+              <a:endParaRPr lang="zh-CN" altLang="en-US" sz="1000" dirty="0">
+                <a:latin typeface="Times New Roman" panose="02020603050405020304" pitchFamily="18" charset="0"/>
+                <a:cs typeface="Times New Roman" panose="02020603050405020304" pitchFamily="18" charset="0"/>
+              </a:endParaRPr>
+            </a:p>
+          </p:txBody>
+        </p:sp>
+        <p:cxnSp>
+          <p:nvCxnSpPr>
+            <p:cNvPr id="70" name="曲线连接符 69"/>
+            <p:cNvCxnSpPr>
+              <a:stCxn id="76" idx="2"/>
+              <a:endCxn id="80" idx="0"/>
+            </p:cNvCxnSpPr>
+            <p:nvPr/>
+          </p:nvCxnSpPr>
+          <p:spPr>
+            <a:xfrm rot="16200000" flipH="1">
+              <a:off x="6657565" y="1884297"/>
+              <a:ext cx="684064" cy="643890"/>
+            </a:xfrm>
+            <a:prstGeom prst="curvedConnector3">
+              <a:avLst/>
+            </a:prstGeom>
+            <a:ln>
+              <a:prstDash val="sysDash"/>
+              <a:tailEnd type="triangle"/>
+            </a:ln>
+          </p:spPr>
+          <p:style>
+            <a:lnRef idx="1">
+              <a:schemeClr val="dk1"/>
+            </a:lnRef>
+            <a:fillRef idx="0">
+              <a:schemeClr val="dk1"/>
+            </a:fillRef>
+            <a:effectRef idx="0">
+              <a:schemeClr val="dk1"/>
+            </a:effectRef>
+            <a:fontRef idx="minor">
+              <a:schemeClr val="tx1"/>
+            </a:fontRef>
+          </p:style>
+        </p:cxnSp>
+        <p:cxnSp>
+          <p:nvCxnSpPr>
+            <p:cNvPr id="71" name="曲线连接符 70"/>
+            <p:cNvCxnSpPr>
+              <a:stCxn id="76" idx="2"/>
+              <a:endCxn id="79" idx="0"/>
+            </p:cNvCxnSpPr>
+            <p:nvPr/>
+          </p:nvCxnSpPr>
+          <p:spPr>
+            <a:xfrm rot="5400000">
+              <a:off x="6335620" y="2206242"/>
+              <a:ext cx="684064" cy="12700"/>
+            </a:xfrm>
+            <a:prstGeom prst="curvedConnector3">
+              <a:avLst/>
+            </a:prstGeom>
+            <a:ln>
+              <a:prstDash val="sysDash"/>
+              <a:tailEnd type="triangle"/>
+            </a:ln>
+          </p:spPr>
+          <p:style>
+            <a:lnRef idx="1">
+              <a:schemeClr val="dk1"/>
+            </a:lnRef>
+            <a:fillRef idx="0">
+              <a:schemeClr val="dk1"/>
+            </a:fillRef>
+            <a:effectRef idx="0">
+              <a:schemeClr val="dk1"/>
+            </a:effectRef>
+            <a:fontRef idx="minor">
+              <a:schemeClr val="tx1"/>
+            </a:fontRef>
+          </p:style>
+        </p:cxnSp>
+        <p:sp>
+          <p:nvSpPr>
+            <p:cNvPr id="72" name="文本框 29"/>
+            <p:cNvSpPr txBox="1"/>
+            <p:nvPr/>
+          </p:nvSpPr>
+          <p:spPr>
+            <a:xfrm>
+              <a:off x="4954889" y="1346471"/>
+              <a:ext cx="272670" cy="246221"/>
+            </a:xfrm>
+            <a:prstGeom prst="rect">
+              <a:avLst/>
+            </a:prstGeom>
+            <a:noFill/>
+          </p:spPr>
+          <p:txBody>
+            <a:bodyPr wrap="square" rtlCol="0">
+              <a:spAutoFit/>
+            </a:bodyPr>
+            <a:lstStyle>
+              <a:defPPr>
+                <a:defRPr lang="zh-CN"/>
+              </a:defPPr>
+              <a:lvl1pPr marL="0" algn="l" defTabSz="914400" rtl="0" eaLnBrk="1" latinLnBrk="0" hangingPunct="1">
+                <a:defRPr sz="1800" kern="1200">
+                  <a:solidFill>
+                    <a:schemeClr val="tx1"/>
+                  </a:solidFill>
+                  <a:latin typeface="+mn-lt"/>
+                  <a:ea typeface="+mn-ea"/>
+                  <a:cs typeface="+mn-cs"/>
+                </a:defRPr>
+              </a:lvl1pPr>
+              <a:lvl2pPr marL="457200" algn="l" defTabSz="914400" rtl="0" eaLnBrk="1" latinLnBrk="0" hangingPunct="1">
+                <a:defRPr sz="1800" kern="1200">
+                  <a:solidFill>
+                    <a:schemeClr val="tx1"/>
+                  </a:solidFill>
+                  <a:latin typeface="+mn-lt"/>
+                  <a:ea typeface="+mn-ea"/>
+                  <a:cs typeface="+mn-cs"/>
+                </a:defRPr>
+              </a:lvl2pPr>
+              <a:lvl3pPr marL="914400" algn="l" defTabSz="914400" rtl="0" eaLnBrk="1" latinLnBrk="0" hangingPunct="1">
+                <a:defRPr sz="1800" kern="1200">
+                  <a:solidFill>
+                    <a:schemeClr val="tx1"/>
+                  </a:solidFill>
+                  <a:latin typeface="+mn-lt"/>
+                  <a:ea typeface="+mn-ea"/>
+                  <a:cs typeface="+mn-cs"/>
+                </a:defRPr>
+              </a:lvl3pPr>
+              <a:lvl4pPr marL="1371600" algn="l" defTabSz="914400" rtl="0" eaLnBrk="1" latinLnBrk="0" hangingPunct="1">
+                <a:defRPr sz="1800" kern="1200">
+                  <a:solidFill>
+                    <a:schemeClr val="tx1"/>
+                  </a:solidFill>
+                  <a:latin typeface="+mn-lt"/>
+                  <a:ea typeface="+mn-ea"/>
+                  <a:cs typeface="+mn-cs"/>
+                </a:defRPr>
+              </a:lvl4pPr>
+              <a:lvl5pPr marL="1828800" algn="l" defTabSz="914400" rtl="0" eaLnBrk="1" latinLnBrk="0" hangingPunct="1">
+                <a:defRPr sz="1800" kern="1200">
+                  <a:solidFill>
+                    <a:schemeClr val="tx1"/>
+                  </a:solidFill>
+                  <a:latin typeface="+mn-lt"/>
+                  <a:ea typeface="+mn-ea"/>
+                  <a:cs typeface="+mn-cs"/>
+                </a:defRPr>
+              </a:lvl5pPr>
+              <a:lvl6pPr marL="2286000" algn="l" defTabSz="914400" rtl="0" eaLnBrk="1" latinLnBrk="0" hangingPunct="1">
+                <a:defRPr sz="1800" kern="1200">
+                  <a:solidFill>
+                    <a:schemeClr val="tx1"/>
+                  </a:solidFill>
+                  <a:latin typeface="+mn-lt"/>
+                  <a:ea typeface="+mn-ea"/>
+                  <a:cs typeface="+mn-cs"/>
+                </a:defRPr>
+              </a:lvl6pPr>
+              <a:lvl7pPr marL="2743200" algn="l" defTabSz="914400" rtl="0" eaLnBrk="1" latinLnBrk="0" hangingPunct="1">
+                <a:defRPr sz="1800" kern="1200">
+                  <a:solidFill>
+                    <a:schemeClr val="tx1"/>
+                  </a:solidFill>
+                  <a:latin typeface="+mn-lt"/>
+                  <a:ea typeface="+mn-ea"/>
+                  <a:cs typeface="+mn-cs"/>
+                </a:defRPr>
+              </a:lvl7pPr>
+              <a:lvl8pPr marL="3200400" algn="l" defTabSz="914400" rtl="0" eaLnBrk="1" latinLnBrk="0" hangingPunct="1">
+                <a:defRPr sz="1800" kern="1200">
+                  <a:solidFill>
+                    <a:schemeClr val="tx1"/>
+                  </a:solidFill>
+                  <a:latin typeface="+mn-lt"/>
+                  <a:ea typeface="+mn-ea"/>
+                  <a:cs typeface="+mn-cs"/>
+                </a:defRPr>
+              </a:lvl8pPr>
+              <a:lvl9pPr marL="3657600" algn="l" defTabSz="914400" rtl="0" eaLnBrk="1" latinLnBrk="0" hangingPunct="1">
+                <a:defRPr sz="1800" kern="1200">
+                  <a:solidFill>
+                    <a:schemeClr val="tx1"/>
+                  </a:solidFill>
+                  <a:latin typeface="+mn-lt"/>
+                  <a:ea typeface="+mn-ea"/>
+                  <a:cs typeface="+mn-cs"/>
+                </a:defRPr>
+              </a:lvl9pPr>
+            </a:lstStyle>
+            <a:p>
+              <a:r>
+                <a:rPr lang="en-US" altLang="zh-CN" sz="1000" dirty="0" smtClean="0">
+                  <a:latin typeface="Times New Roman" panose="02020603050405020304" pitchFamily="18" charset="0"/>
+                  <a:cs typeface="Times New Roman" panose="02020603050405020304" pitchFamily="18" charset="0"/>
+                </a:rPr>
+                <a:t>2</a:t>
+              </a:r>
+              <a:endParaRPr lang="zh-CN" altLang="en-US" sz="1000" dirty="0">
+                <a:latin typeface="Times New Roman" panose="02020603050405020304" pitchFamily="18" charset="0"/>
+                <a:cs typeface="Times New Roman" panose="02020603050405020304" pitchFamily="18" charset="0"/>
+              </a:endParaRPr>
+            </a:p>
+          </p:txBody>
+        </p:sp>
+        <p:cxnSp>
+          <p:nvCxnSpPr>
+            <p:cNvPr id="73" name="直接箭头连接符 72"/>
+            <p:cNvCxnSpPr>
+              <a:stCxn id="68" idx="6"/>
+              <a:endCxn id="79" idx="1"/>
+            </p:cNvCxnSpPr>
+            <p:nvPr/>
+          </p:nvCxnSpPr>
+          <p:spPr>
+            <a:xfrm>
+              <a:off x="5492236" y="1947373"/>
+              <a:ext cx="880616" cy="720916"/>
+            </a:xfrm>
+            <a:prstGeom prst="straightConnector1">
+              <a:avLst/>
+            </a:prstGeom>
+            <a:ln>
+              <a:tailEnd type="triangle"/>
+            </a:ln>
+          </p:spPr>
+          <p:style>
+            <a:lnRef idx="1">
+              <a:schemeClr val="dk1"/>
+            </a:lnRef>
+            <a:fillRef idx="0">
+              <a:schemeClr val="dk1"/>
+            </a:fillRef>
+            <a:effectRef idx="0">
+              <a:schemeClr val="dk1"/>
+            </a:effectRef>
+            <a:fontRef idx="minor">
+              <a:schemeClr val="tx1"/>
+            </a:fontRef>
+          </p:style>
+        </p:cxnSp>
+        <p:cxnSp>
+          <p:nvCxnSpPr>
+            <p:cNvPr id="74" name="直接箭头连接符 73"/>
+            <p:cNvCxnSpPr>
+              <a:stCxn id="82" idx="2"/>
+              <a:endCxn id="76" idx="0"/>
+            </p:cNvCxnSpPr>
+            <p:nvPr/>
+          </p:nvCxnSpPr>
+          <p:spPr>
+            <a:xfrm flipH="1">
+              <a:off x="6677652" y="989815"/>
+              <a:ext cx="133541" cy="634365"/>
+            </a:xfrm>
+            <a:prstGeom prst="straightConnector1">
+              <a:avLst/>
+            </a:prstGeom>
+            <a:ln>
+              <a:tailEnd type="triangle"/>
+            </a:ln>
+          </p:spPr>
+          <p:style>
+            <a:lnRef idx="1">
+              <a:schemeClr val="dk1"/>
+            </a:lnRef>
+            <a:fillRef idx="0">
+              <a:schemeClr val="dk1"/>
+            </a:fillRef>
+            <a:effectRef idx="0">
+              <a:schemeClr val="dk1"/>
+            </a:effectRef>
+            <a:fontRef idx="minor">
+              <a:schemeClr val="tx1"/>
+            </a:fontRef>
+          </p:style>
+        </p:cxnSp>
+        <p:cxnSp>
+          <p:nvCxnSpPr>
+            <p:cNvPr id="111" name="直接箭头连接符 110"/>
+            <p:cNvCxnSpPr>
+              <a:stCxn id="79" idx="0"/>
+              <a:endCxn id="66" idx="2"/>
+            </p:cNvCxnSpPr>
+            <p:nvPr/>
+          </p:nvCxnSpPr>
+          <p:spPr>
+            <a:xfrm flipH="1" flipV="1">
+              <a:off x="5212454" y="1122297"/>
+              <a:ext cx="1465198" cy="1425977"/>
+            </a:xfrm>
+            <a:prstGeom prst="straightConnector1">
+              <a:avLst/>
+            </a:prstGeom>
+            <a:ln>
+              <a:tailEnd type="triangle"/>
+            </a:ln>
+          </p:spPr>
+          <p:style>
+            <a:lnRef idx="1">
+              <a:schemeClr val="dk1"/>
+            </a:lnRef>
+            <a:fillRef idx="0">
+              <a:schemeClr val="dk1"/>
+            </a:fillRef>
+            <a:effectRef idx="0">
+              <a:schemeClr val="dk1"/>
+            </a:effectRef>
+            <a:fontRef idx="minor">
+              <a:schemeClr val="tx1"/>
+            </a:fontRef>
+          </p:style>
+        </p:cxnSp>
+        <p:sp>
+          <p:nvSpPr>
+            <p:cNvPr id="112" name="文本框 29"/>
+            <p:cNvSpPr txBox="1"/>
+            <p:nvPr/>
+          </p:nvSpPr>
+          <p:spPr>
+            <a:xfrm>
+              <a:off x="5611424" y="2083131"/>
+              <a:ext cx="272670" cy="246221"/>
+            </a:xfrm>
+            <a:prstGeom prst="rect">
+              <a:avLst/>
+            </a:prstGeom>
+            <a:noFill/>
+          </p:spPr>
+          <p:txBody>
+            <a:bodyPr wrap="square" rtlCol="0">
+              <a:spAutoFit/>
+            </a:bodyPr>
+            <a:lstStyle>
+              <a:defPPr>
+                <a:defRPr lang="zh-CN"/>
+              </a:defPPr>
+              <a:lvl1pPr marL="0" algn="l" defTabSz="914400" rtl="0" eaLnBrk="1" latinLnBrk="0" hangingPunct="1">
+                <a:defRPr sz="1800" kern="1200">
+                  <a:solidFill>
+                    <a:schemeClr val="tx1"/>
+                  </a:solidFill>
+                  <a:latin typeface="+mn-lt"/>
+                  <a:ea typeface="+mn-ea"/>
+                  <a:cs typeface="+mn-cs"/>
+                </a:defRPr>
+              </a:lvl1pPr>
+              <a:lvl2pPr marL="457200" algn="l" defTabSz="914400" rtl="0" eaLnBrk="1" latinLnBrk="0" hangingPunct="1">
+                <a:defRPr sz="1800" kern="1200">
+                  <a:solidFill>
+                    <a:schemeClr val="tx1"/>
+                  </a:solidFill>
+                  <a:latin typeface="+mn-lt"/>
+                  <a:ea typeface="+mn-ea"/>
+                  <a:cs typeface="+mn-cs"/>
+                </a:defRPr>
+              </a:lvl2pPr>
+              <a:lvl3pPr marL="914400" algn="l" defTabSz="914400" rtl="0" eaLnBrk="1" latinLnBrk="0" hangingPunct="1">
+                <a:defRPr sz="1800" kern="1200">
+                  <a:solidFill>
+                    <a:schemeClr val="tx1"/>
+                  </a:solidFill>
+                  <a:latin typeface="+mn-lt"/>
+                  <a:ea typeface="+mn-ea"/>
+                  <a:cs typeface="+mn-cs"/>
+                </a:defRPr>
+              </a:lvl3pPr>
+              <a:lvl4pPr marL="1371600" algn="l" defTabSz="914400" rtl="0" eaLnBrk="1" latinLnBrk="0" hangingPunct="1">
+                <a:defRPr sz="1800" kern="1200">
+                  <a:solidFill>
+                    <a:schemeClr val="tx1"/>
+                  </a:solidFill>
+                  <a:latin typeface="+mn-lt"/>
+                  <a:ea typeface="+mn-ea"/>
+                  <a:cs typeface="+mn-cs"/>
+                </a:defRPr>
+              </a:lvl4pPr>
+              <a:lvl5pPr marL="1828800" algn="l" defTabSz="914400" rtl="0" eaLnBrk="1" latinLnBrk="0" hangingPunct="1">
+                <a:defRPr sz="1800" kern="1200">
+                  <a:solidFill>
+                    <a:schemeClr val="tx1"/>
+                  </a:solidFill>
+                  <a:latin typeface="+mn-lt"/>
+                  <a:ea typeface="+mn-ea"/>
+                  <a:cs typeface="+mn-cs"/>
+                </a:defRPr>
+              </a:lvl5pPr>
+              <a:lvl6pPr marL="2286000" algn="l" defTabSz="914400" rtl="0" eaLnBrk="1" latinLnBrk="0" hangingPunct="1">
+                <a:defRPr sz="1800" kern="1200">
+                  <a:solidFill>
+                    <a:schemeClr val="tx1"/>
+                  </a:solidFill>
+                  <a:latin typeface="+mn-lt"/>
+                  <a:ea typeface="+mn-ea"/>
+                  <a:cs typeface="+mn-cs"/>
+                </a:defRPr>
+              </a:lvl6pPr>
+              <a:lvl7pPr marL="2743200" algn="l" defTabSz="914400" rtl="0" eaLnBrk="1" latinLnBrk="0" hangingPunct="1">
+                <a:defRPr sz="1800" kern="1200">
+                  <a:solidFill>
+                    <a:schemeClr val="tx1"/>
+                  </a:solidFill>
+                  <a:latin typeface="+mn-lt"/>
+                  <a:ea typeface="+mn-ea"/>
+                  <a:cs typeface="+mn-cs"/>
+                </a:defRPr>
+              </a:lvl7pPr>
+              <a:lvl8pPr marL="3200400" algn="l" defTabSz="914400" rtl="0" eaLnBrk="1" latinLnBrk="0" hangingPunct="1">
+                <a:defRPr sz="1800" kern="1200">
+                  <a:solidFill>
+                    <a:schemeClr val="tx1"/>
+                  </a:solidFill>
+                  <a:latin typeface="+mn-lt"/>
+                  <a:ea typeface="+mn-ea"/>
+                  <a:cs typeface="+mn-cs"/>
+                </a:defRPr>
+              </a:lvl8pPr>
+              <a:lvl9pPr marL="3657600" algn="l" defTabSz="914400" rtl="0" eaLnBrk="1" latinLnBrk="0" hangingPunct="1">
+                <a:defRPr sz="1800" kern="1200">
+                  <a:solidFill>
+                    <a:schemeClr val="tx1"/>
+                  </a:solidFill>
+                  <a:latin typeface="+mn-lt"/>
+                  <a:ea typeface="+mn-ea"/>
+                  <a:cs typeface="+mn-cs"/>
+                </a:defRPr>
+              </a:lvl9pPr>
+            </a:lstStyle>
+            <a:p>
+              <a:r>
+                <a:rPr lang="en-US" altLang="zh-CN" sz="1000" dirty="0" smtClean="0">
+                  <a:latin typeface="Times New Roman" panose="02020603050405020304" pitchFamily="18" charset="0"/>
+                  <a:cs typeface="Times New Roman" panose="02020603050405020304" pitchFamily="18" charset="0"/>
+                </a:rPr>
+                <a:t>3</a:t>
+              </a:r>
+              <a:endParaRPr lang="zh-CN" altLang="en-US" sz="1000" dirty="0">
+                <a:latin typeface="Times New Roman" panose="02020603050405020304" pitchFamily="18" charset="0"/>
+                <a:cs typeface="Times New Roman" panose="02020603050405020304" pitchFamily="18" charset="0"/>
+              </a:endParaRPr>
+            </a:p>
+          </p:txBody>
+        </p:sp>
+      </p:grpSp>
     </p:spTree>
     <p:extLst>
       <p:ext uri="{BB962C8B-B14F-4D97-AF65-F5344CB8AC3E}">

</xml_diff>